<commit_message>
updated to presentation and added network in docker
</commit_message>
<xml_diff>
--- a/Kafka Talk.pptx
+++ b/Kafka Talk.pptx
@@ -5,7 +5,7 @@
     <p:sldMasterId id="2147483840" r:id="rId1"/>
   </p:sldMasterIdLst>
   <p:notesMasterIdLst>
-    <p:notesMasterId r:id="rId57"/>
+    <p:notesMasterId r:id="rId58"/>
   </p:notesMasterIdLst>
   <p:sldIdLst>
     <p:sldId id="258" r:id="rId2"/>
@@ -48,21 +48,22 @@
     <p:sldId id="302" r:id="rId39"/>
     <p:sldId id="306" r:id="rId40"/>
     <p:sldId id="310" r:id="rId41"/>
-    <p:sldId id="297" r:id="rId42"/>
-    <p:sldId id="311" r:id="rId43"/>
-    <p:sldId id="279" r:id="rId44"/>
-    <p:sldId id="317" r:id="rId45"/>
-    <p:sldId id="312" r:id="rId46"/>
+    <p:sldId id="312" r:id="rId42"/>
+    <p:sldId id="297" r:id="rId43"/>
+    <p:sldId id="311" r:id="rId44"/>
+    <p:sldId id="279" r:id="rId45"/>
+    <p:sldId id="317" r:id="rId46"/>
     <p:sldId id="265" r:id="rId47"/>
-    <p:sldId id="316" r:id="rId48"/>
-    <p:sldId id="313" r:id="rId49"/>
-    <p:sldId id="322" r:id="rId50"/>
-    <p:sldId id="318" r:id="rId51"/>
-    <p:sldId id="319" r:id="rId52"/>
-    <p:sldId id="321" r:id="rId53"/>
-    <p:sldId id="320" r:id="rId54"/>
-    <p:sldId id="266" r:id="rId55"/>
-    <p:sldId id="267" r:id="rId56"/>
+    <p:sldId id="322" r:id="rId48"/>
+    <p:sldId id="318" r:id="rId49"/>
+    <p:sldId id="319" r:id="rId50"/>
+    <p:sldId id="321" r:id="rId51"/>
+    <p:sldId id="320" r:id="rId52"/>
+    <p:sldId id="266" r:id="rId53"/>
+    <p:sldId id="267" r:id="rId54"/>
+    <p:sldId id="316" r:id="rId55"/>
+    <p:sldId id="313" r:id="rId56"/>
+    <p:sldId id="323" r:id="rId57"/>
   </p:sldIdLst>
   <p:sldSz cx="12192000" cy="6858000"/>
   <p:notesSz cx="6858000" cy="9144000"/>
@@ -33781,6 +33782,15 @@
             </a:pPr>
             <a:r>
               <a:rPr lang="en-US" dirty="0"/>
+              <a:t>Show why kafka1 is not enough</a:t>
+            </a:r>
+          </a:p>
+          <a:p>
+            <a:pPr marL="228600" indent="-228600">
+              <a:buAutoNum type="arabicPeriod"/>
+            </a:pPr>
+            <a:r>
+              <a:rPr lang="en-US" dirty="0"/>
               <a:t>Run locally the "default configuration" and try to explain</a:t>
             </a:r>
           </a:p>
@@ -33849,6 +33859,169 @@
               <a:rPr lang="de-CH" dirty="0" err="1"/>
               <a:t>strings</a:t>
             </a:r>
+            <a:endParaRPr lang="de-CH" dirty="0"/>
+          </a:p>
+          <a:p>
+            <a:pPr marL="228600" indent="-228600">
+              <a:buAutoNum type="arabicPeriod"/>
+            </a:pPr>
+            <a:r>
+              <a:rPr lang="en-US" dirty="0"/>
+              <a:t>S</a:t>
+            </a:r>
+            <a:r>
+              <a:rPr lang="de-CH" dirty="0" err="1"/>
+              <a:t>how</a:t>
+            </a:r>
+            <a:r>
+              <a:rPr lang="de-CH" dirty="0"/>
+              <a:t> </a:t>
+            </a:r>
+            <a:r>
+              <a:rPr lang="de-CH" dirty="0" err="1"/>
+              <a:t>filter</a:t>
+            </a:r>
+            <a:r>
+              <a:rPr lang="de-CH" dirty="0"/>
+              <a:t>, </a:t>
+            </a:r>
+            <a:r>
+              <a:rPr lang="de-CH" dirty="0" err="1"/>
+              <a:t>map</a:t>
+            </a:r>
+            <a:r>
+              <a:rPr lang="de-CH" dirty="0"/>
+              <a:t> (reverse </a:t>
+            </a:r>
+            <a:r>
+              <a:rPr lang="de-CH" dirty="0" err="1"/>
+              <a:t>string</a:t>
+            </a:r>
+            <a:r>
+              <a:rPr lang="de-CH" dirty="0"/>
+              <a:t>), </a:t>
+            </a:r>
+          </a:p>
+          <a:p>
+            <a:pPr marL="228600" indent="-228600">
+              <a:buAutoNum type="arabicPeriod"/>
+            </a:pPr>
+            <a:r>
+              <a:rPr lang="en-US" dirty="0"/>
+              <a:t>C</a:t>
+            </a:r>
+            <a:r>
+              <a:rPr lang="de-CH" dirty="0"/>
+              <a:t>hange </a:t>
+            </a:r>
+            <a:r>
+              <a:rPr lang="de-CH" dirty="0" err="1"/>
+              <a:t>to</a:t>
+            </a:r>
+            <a:r>
+              <a:rPr lang="de-CH" dirty="0"/>
+              <a:t> </a:t>
+            </a:r>
+            <a:r>
+              <a:rPr lang="de-CH" dirty="0" err="1"/>
+              <a:t>json</a:t>
+            </a:r>
+            <a:r>
+              <a:rPr lang="de-CH" dirty="0"/>
+              <a:t> – </a:t>
+            </a:r>
+            <a:r>
+              <a:rPr lang="de-CH" dirty="0" err="1"/>
+              <a:t>explain</a:t>
+            </a:r>
+            <a:r>
+              <a:rPr lang="de-CH" dirty="0"/>
+              <a:t> </a:t>
+            </a:r>
+            <a:r>
+              <a:rPr lang="de-CH" dirty="0" err="1"/>
+              <a:t>jsonSerde</a:t>
+            </a:r>
+            <a:r>
+              <a:rPr lang="de-CH" dirty="0"/>
+              <a:t> </a:t>
+            </a:r>
+            <a:r>
+              <a:rPr lang="de-CH" dirty="0" err="1"/>
+              <a:t>why</a:t>
+            </a:r>
+            <a:r>
+              <a:rPr lang="de-CH" dirty="0"/>
+              <a:t> </a:t>
+            </a:r>
+            <a:r>
+              <a:rPr lang="de-CH" dirty="0" err="1"/>
+              <a:t>needed</a:t>
+            </a:r>
+            <a:r>
+              <a:rPr lang="de-CH" dirty="0"/>
+              <a:t> </a:t>
+            </a:r>
+            <a:r>
+              <a:rPr lang="de-CH" dirty="0" err="1"/>
+              <a:t>custom</a:t>
+            </a:r>
+            <a:r>
+              <a:rPr lang="de-CH" dirty="0"/>
+              <a:t> </a:t>
+            </a:r>
+            <a:r>
+              <a:rPr lang="de-CH" dirty="0">
+                <a:hlinkClick r:id="rId3"/>
+              </a:rPr>
+              <a:t>https://kafka.apache.org/10/documentation/streams/developer-guide/datatypes.html#json</a:t>
+            </a:r>
+            <a:endParaRPr lang="de-CH" dirty="0"/>
+          </a:p>
+          <a:p>
+            <a:pPr marL="228600" indent="-228600">
+              <a:buAutoNum type="arabicPeriod"/>
+            </a:pPr>
+            <a:r>
+              <a:rPr lang="en-US" dirty="0"/>
+              <a:t>Show multiple partitions</a:t>
+            </a:r>
+            <a:endParaRPr lang="de-CH" dirty="0"/>
+          </a:p>
+          <a:p>
+            <a:pPr marL="228600" indent="-228600">
+              <a:buAutoNum type="arabicPeriod"/>
+            </a:pPr>
+            <a:endParaRPr lang="de-CH" dirty="0"/>
+          </a:p>
+          <a:p>
+            <a:pPr marL="228600" indent="-228600">
+              <a:buAutoNum type="arabicPeriod"/>
+            </a:pPr>
+            <a:endParaRPr lang="de-CH" dirty="0"/>
+          </a:p>
+          <a:p>
+            <a:pPr marL="228600" indent="-228600">
+              <a:buAutoNum type="arabicPeriod"/>
+            </a:pPr>
+            <a:endParaRPr lang="de-CH" dirty="0"/>
+          </a:p>
+          <a:p>
+            <a:pPr marL="228600" indent="-228600">
+              <a:buAutoNum type="arabicPeriod"/>
+            </a:pPr>
+            <a:endParaRPr lang="de-CH" dirty="0"/>
+          </a:p>
+          <a:p>
+            <a:pPr marL="228600" indent="-228600">
+              <a:buAutoNum type="arabicPeriod"/>
+            </a:pPr>
+            <a:endParaRPr lang="de-CH" dirty="0"/>
+          </a:p>
+          <a:p>
+            <a:pPr marL="228600" indent="-228600">
+              <a:buAutoNum type="arabicPeriod"/>
+            </a:pPr>
             <a:endParaRPr lang="en-US" dirty="0"/>
           </a:p>
         </p:txBody>
@@ -34019,6 +34192,120 @@
           <a:p>
             <a:r>
               <a:rPr lang="en-US" dirty="0"/>
+              <a:t>Show code .</a:t>
+            </a:r>
+            <a:r>
+              <a:rPr lang="en-US" dirty="0" err="1"/>
+              <a:t>groupBYKey</a:t>
+            </a:r>
+            <a:r>
+              <a:rPr lang="en-US" dirty="0"/>
+              <a:t> .reduce – particular partitions</a:t>
+            </a:r>
+          </a:p>
+          <a:p>
+            <a:r>
+              <a:rPr lang="en-US" dirty="0"/>
+              <a:t>Show code </a:t>
+            </a:r>
+            <a:r>
+              <a:rPr lang="en-US" dirty="0" err="1"/>
+              <a:t>GlobalTable</a:t>
+            </a:r>
+            <a:r>
+              <a:rPr lang="en-US" dirty="0"/>
+              <a:t>, change to </a:t>
+            </a:r>
+            <a:r>
+              <a:rPr lang="en-US" dirty="0" err="1"/>
+              <a:t>dummy,run</a:t>
+            </a:r>
+            <a:endParaRPr lang="de-CH" dirty="0"/>
+          </a:p>
+        </p:txBody>
+      </p:sp>
+      <p:sp>
+        <p:nvSpPr>
+          <p:cNvPr id="4" name="Slide Number Placeholder 3"/>
+          <p:cNvSpPr>
+            <a:spLocks noGrp="1"/>
+          </p:cNvSpPr>
+          <p:nvPr>
+            <p:ph type="sldNum" sz="quarter" idx="10"/>
+          </p:nvPr>
+        </p:nvSpPr>
+        <p:spPr/>
+        <p:txBody>
+          <a:bodyPr/>
+          <a:lstStyle/>
+          <a:p>
+            <a:fld id="{279846BD-AD4B-4A8B-B060-6EB157632DFC}" type="slidenum">
+              <a:rPr lang="de-CH" smtClean="0"/>
+              <a:t>43</a:t>
+            </a:fld>
+            <a:endParaRPr lang="de-CH"/>
+          </a:p>
+        </p:txBody>
+      </p:sp>
+    </p:spTree>
+    <p:extLst>
+      <p:ext uri="{BB962C8B-B14F-4D97-AF65-F5344CB8AC3E}">
+        <p14:creationId xmlns:p14="http://schemas.microsoft.com/office/powerpoint/2010/main" val="2431570607"/>
+      </p:ext>
+    </p:extLst>
+  </p:cSld>
+  <p:clrMapOvr>
+    <a:masterClrMapping/>
+  </p:clrMapOvr>
+</p:notes>
+</file>
+
+<file path=ppt/notesSlides/notesSlide18.xml><?xml version="1.0" encoding="utf-8"?>
+<p:notes xmlns:a="http://schemas.openxmlformats.org/drawingml/2006/main" xmlns:r="http://schemas.openxmlformats.org/officeDocument/2006/relationships" xmlns:p="http://schemas.openxmlformats.org/presentationml/2006/main">
+  <p:cSld>
+    <p:spTree>
+      <p:nvGrpSpPr>
+        <p:cNvPr id="1" name=""/>
+        <p:cNvGrpSpPr/>
+        <p:nvPr/>
+      </p:nvGrpSpPr>
+      <p:grpSpPr>
+        <a:xfrm>
+          <a:off x="0" y="0"/>
+          <a:ext cx="0" cy="0"/>
+          <a:chOff x="0" y="0"/>
+          <a:chExt cx="0" cy="0"/>
+        </a:xfrm>
+      </p:grpSpPr>
+      <p:sp>
+        <p:nvSpPr>
+          <p:cNvPr id="2" name="Slide Image Placeholder 1"/>
+          <p:cNvSpPr>
+            <a:spLocks noGrp="1" noRot="1" noChangeAspect="1"/>
+          </p:cNvSpPr>
+          <p:nvPr>
+            <p:ph type="sldImg"/>
+          </p:nvPr>
+        </p:nvSpPr>
+        <p:spPr/>
+      </p:sp>
+      <p:sp>
+        <p:nvSpPr>
+          <p:cNvPr id="3" name="Notes Placeholder 2"/>
+          <p:cNvSpPr>
+            <a:spLocks noGrp="1"/>
+          </p:cNvSpPr>
+          <p:nvPr>
+            <p:ph type="body" idx="1"/>
+          </p:nvPr>
+        </p:nvSpPr>
+        <p:spPr/>
+        <p:txBody>
+          <a:bodyPr/>
+          <a:lstStyle/>
+          <a:p>
+            <a:r>
+              <a:rPr lang="en-US" dirty="0"/>
               <a:t>Main characteristics:</a:t>
             </a:r>
           </a:p>
@@ -34104,7 +34391,7 @@
           <a:p>
             <a:fld id="{279846BD-AD4B-4A8B-B060-6EB157632DFC}" type="slidenum">
               <a:rPr lang="de-CH" smtClean="0"/>
-              <a:t>43</a:t>
+              <a:t>44</a:t>
             </a:fld>
             <a:endParaRPr lang="de-CH"/>
           </a:p>
@@ -34123,7 +34410,7 @@
 </p:notes>
 </file>
 
-<file path=ppt/notesSlides/notesSlide18.xml><?xml version="1.0" encoding="utf-8"?>
+<file path=ppt/notesSlides/notesSlide19.xml><?xml version="1.0" encoding="utf-8"?>
 <p:notes xmlns:a="http://schemas.openxmlformats.org/drawingml/2006/main" xmlns:r="http://schemas.openxmlformats.org/officeDocument/2006/relationships" xmlns:p="http://schemas.openxmlformats.org/presentationml/2006/main">
   <p:cSld>
     <p:spTree>
@@ -34188,7 +34475,7 @@
           <a:p>
             <a:fld id="{279846BD-AD4B-4A8B-B060-6EB157632DFC}" type="slidenum">
               <a:rPr lang="de-CH" smtClean="0"/>
-              <a:t>54</a:t>
+              <a:t>52</a:t>
             </a:fld>
             <a:endParaRPr lang="de-CH"/>
           </a:p>
@@ -34207,7 +34494,201 @@
 </p:notes>
 </file>
 
-<file path=ppt/notesSlides/notesSlide19.xml><?xml version="1.0" encoding="utf-8"?>
+<file path=ppt/notesSlides/notesSlide2.xml><?xml version="1.0" encoding="utf-8"?>
+<p:notes xmlns:a="http://schemas.openxmlformats.org/drawingml/2006/main" xmlns:r="http://schemas.openxmlformats.org/officeDocument/2006/relationships" xmlns:p="http://schemas.openxmlformats.org/presentationml/2006/main">
+  <p:cSld>
+    <p:spTree>
+      <p:nvGrpSpPr>
+        <p:cNvPr id="1" name=""/>
+        <p:cNvGrpSpPr/>
+        <p:nvPr/>
+      </p:nvGrpSpPr>
+      <p:grpSpPr>
+        <a:xfrm>
+          <a:off x="0" y="0"/>
+          <a:ext cx="0" cy="0"/>
+          <a:chOff x="0" y="0"/>
+          <a:chExt cx="0" cy="0"/>
+        </a:xfrm>
+      </p:grpSpPr>
+      <p:sp>
+        <p:nvSpPr>
+          <p:cNvPr id="2" name="Slide Image Placeholder 1"/>
+          <p:cNvSpPr>
+            <a:spLocks noGrp="1" noRot="1" noChangeAspect="1"/>
+          </p:cNvSpPr>
+          <p:nvPr>
+            <p:ph type="sldImg"/>
+          </p:nvPr>
+        </p:nvSpPr>
+        <p:spPr/>
+      </p:sp>
+      <p:sp>
+        <p:nvSpPr>
+          <p:cNvPr id="3" name="Notes Placeholder 2"/>
+          <p:cNvSpPr>
+            <a:spLocks noGrp="1"/>
+          </p:cNvSpPr>
+          <p:nvPr>
+            <p:ph type="body" idx="1"/>
+          </p:nvPr>
+        </p:nvSpPr>
+        <p:spPr/>
+        <p:txBody>
+          <a:bodyPr/>
+          <a:lstStyle/>
+          <a:p>
+            <a:pPr marL="171450" indent="-171450">
+              <a:buFontTx/>
+              <a:buChar char="-"/>
+            </a:pPr>
+            <a:r>
+              <a:rPr lang="en-US" dirty="0"/>
+              <a:t>Swisscom employee</a:t>
+            </a:r>
+            <a:endParaRPr lang="de-CH" dirty="0"/>
+          </a:p>
+          <a:p>
+            <a:pPr marL="171450" indent="-171450">
+              <a:buFontTx/>
+              <a:buChar char="-"/>
+            </a:pPr>
+            <a:r>
+              <a:rPr lang="en-US" dirty="0"/>
+              <a:t>T</a:t>
+            </a:r>
+            <a:r>
+              <a:rPr lang="de-CH" dirty="0" err="1"/>
+              <a:t>his</a:t>
+            </a:r>
+            <a:r>
+              <a:rPr lang="de-CH" dirty="0"/>
+              <a:t> </a:t>
+            </a:r>
+            <a:r>
+              <a:rPr lang="de-CH" dirty="0" err="1"/>
+              <a:t>is</a:t>
+            </a:r>
+            <a:r>
+              <a:rPr lang="de-CH" dirty="0"/>
+              <a:t> </a:t>
+            </a:r>
+            <a:r>
+              <a:rPr lang="de-CH" dirty="0" err="1"/>
+              <a:t>my</a:t>
+            </a:r>
+            <a:r>
+              <a:rPr lang="de-CH" dirty="0"/>
+              <a:t> email </a:t>
+            </a:r>
+            <a:r>
+              <a:rPr lang="de-CH" dirty="0" err="1"/>
+              <a:t>you</a:t>
+            </a:r>
+            <a:r>
+              <a:rPr lang="de-CH" dirty="0"/>
+              <a:t> </a:t>
+            </a:r>
+            <a:r>
+              <a:rPr lang="de-CH" dirty="0" err="1"/>
+              <a:t>can</a:t>
+            </a:r>
+            <a:r>
+              <a:rPr lang="de-CH" dirty="0"/>
+              <a:t> </a:t>
+            </a:r>
+            <a:r>
+              <a:rPr lang="de-CH" dirty="0" err="1"/>
+              <a:t>contact</a:t>
+            </a:r>
+            <a:r>
+              <a:rPr lang="de-CH" dirty="0"/>
+              <a:t> </a:t>
+            </a:r>
+            <a:r>
+              <a:rPr lang="de-CH" dirty="0" err="1"/>
+              <a:t>me</a:t>
+            </a:r>
+            <a:r>
+              <a:rPr lang="de-CH" dirty="0"/>
+              <a:t>, </a:t>
+            </a:r>
+            <a:r>
+              <a:rPr lang="de-CH" dirty="0" err="1"/>
+              <a:t>or</a:t>
+            </a:r>
+            <a:r>
+              <a:rPr lang="de-CH" dirty="0"/>
+              <a:t> </a:t>
+            </a:r>
+            <a:r>
+              <a:rPr lang="de-CH" dirty="0" err="1"/>
+              <a:t>gmail</a:t>
+            </a:r>
+            <a:r>
+              <a:rPr lang="de-CH" dirty="0"/>
+              <a:t> </a:t>
+            </a:r>
+            <a:r>
+              <a:rPr lang="de-CH" dirty="0" err="1"/>
+              <a:t>if</a:t>
+            </a:r>
+            <a:r>
+              <a:rPr lang="de-CH" dirty="0"/>
+              <a:t> I was </a:t>
+            </a:r>
+            <a:r>
+              <a:rPr lang="de-CH" dirty="0" err="1"/>
+              <a:t>fired</a:t>
+            </a:r>
+            <a:endParaRPr lang="de-CH" dirty="0"/>
+          </a:p>
+          <a:p>
+            <a:pPr marL="0" indent="0">
+              <a:buFontTx/>
+              <a:buNone/>
+            </a:pPr>
+            <a:endParaRPr lang="en-US" dirty="0"/>
+          </a:p>
+        </p:txBody>
+      </p:sp>
+      <p:sp>
+        <p:nvSpPr>
+          <p:cNvPr id="4" name="Slide Number Placeholder 3"/>
+          <p:cNvSpPr>
+            <a:spLocks noGrp="1"/>
+          </p:cNvSpPr>
+          <p:nvPr>
+            <p:ph type="sldNum" sz="quarter" idx="10"/>
+          </p:nvPr>
+        </p:nvSpPr>
+        <p:spPr/>
+        <p:txBody>
+          <a:bodyPr/>
+          <a:lstStyle/>
+          <a:p>
+            <a:fld id="{279846BD-AD4B-4A8B-B060-6EB157632DFC}" type="slidenum">
+              <a:rPr lang="de-CH" smtClean="0"/>
+              <a:t>2</a:t>
+            </a:fld>
+            <a:endParaRPr lang="de-CH"/>
+          </a:p>
+        </p:txBody>
+      </p:sp>
+    </p:spTree>
+    <p:extLst>
+      <p:ext uri="{BB962C8B-B14F-4D97-AF65-F5344CB8AC3E}">
+        <p14:creationId xmlns:p14="http://schemas.microsoft.com/office/powerpoint/2010/main" val="548801151"/>
+      </p:ext>
+    </p:extLst>
+  </p:cSld>
+  <p:clrMapOvr>
+    <a:masterClrMapping/>
+  </p:clrMapOvr>
+</p:notes>
+</file>
+
+<file path=ppt/notesSlides/notesSlide20.xml><?xml version="1.0" encoding="utf-8"?>
 <p:notes xmlns:a="http://schemas.openxmlformats.org/drawingml/2006/main" xmlns:r="http://schemas.openxmlformats.org/officeDocument/2006/relationships" xmlns:p="http://schemas.openxmlformats.org/presentationml/2006/main">
   <p:cSld>
     <p:spTree>
@@ -34466,7 +34947,7 @@
           <a:p>
             <a:fld id="{279846BD-AD4B-4A8B-B060-6EB157632DFC}" type="slidenum">
               <a:rPr lang="de-CH" smtClean="0"/>
-              <a:t>55</a:t>
+              <a:t>53</a:t>
             </a:fld>
             <a:endParaRPr lang="de-CH"/>
           </a:p>
@@ -34485,7 +34966,7 @@
 </p:notes>
 </file>
 
-<file path=ppt/notesSlides/notesSlide2.xml><?xml version="1.0" encoding="utf-8"?>
+<file path=ppt/notesSlides/notesSlide21.xml><?xml version="1.0" encoding="utf-8"?>
 <p:notes xmlns:a="http://schemas.openxmlformats.org/drawingml/2006/main" xmlns:r="http://schemas.openxmlformats.org/officeDocument/2006/relationships" xmlns:p="http://schemas.openxmlformats.org/presentationml/2006/main">
   <p:cSld>
     <p:spTree>
@@ -34660,7 +35141,7 @@
           <a:p>
             <a:fld id="{279846BD-AD4B-4A8B-B060-6EB157632DFC}" type="slidenum">
               <a:rPr lang="de-CH" smtClean="0"/>
-              <a:t>2</a:t>
+              <a:t>56</a:t>
             </a:fld>
             <a:endParaRPr lang="de-CH"/>
           </a:p>
@@ -34669,7 +35150,7 @@
     </p:spTree>
     <p:extLst>
       <p:ext uri="{BB962C8B-B14F-4D97-AF65-F5344CB8AC3E}">
-        <p14:creationId xmlns:p14="http://schemas.microsoft.com/office/powerpoint/2010/main" val="548801151"/>
+        <p14:creationId xmlns:p14="http://schemas.microsoft.com/office/powerpoint/2010/main" val="355357645"/>
       </p:ext>
     </p:extLst>
   </p:cSld>
@@ -34766,6 +35247,61 @@
               <a:rPr lang="de-CH" dirty="0"/>
               <a:t> Kafka</a:t>
             </a:r>
+          </a:p>
+          <a:p>
+            <a:pPr marL="171450" indent="-171450">
+              <a:buFontTx/>
+              <a:buChar char="-"/>
+            </a:pPr>
+            <a:r>
+              <a:rPr lang="en-US" dirty="0"/>
+              <a:t>S</a:t>
+            </a:r>
+            <a:r>
+              <a:rPr lang="de-CH" dirty="0" err="1"/>
+              <a:t>hare</a:t>
+            </a:r>
+            <a:r>
+              <a:rPr lang="de-CH" dirty="0"/>
+              <a:t> </a:t>
+            </a:r>
+            <a:r>
+              <a:rPr lang="de-CH" dirty="0" err="1"/>
+              <a:t>the</a:t>
+            </a:r>
+            <a:r>
+              <a:rPr lang="de-CH" dirty="0"/>
+              <a:t> </a:t>
+            </a:r>
+            <a:r>
+              <a:rPr lang="de-CH" dirty="0" err="1"/>
+              <a:t>story</a:t>
+            </a:r>
+            <a:r>
+              <a:rPr lang="de-CH" dirty="0"/>
+              <a:t>, </a:t>
+            </a:r>
+            <a:r>
+              <a:rPr lang="de-CH" dirty="0" err="1"/>
+              <a:t>very</a:t>
+            </a:r>
+            <a:r>
+              <a:rPr lang="de-CH" dirty="0"/>
+              <a:t> nice </a:t>
+            </a:r>
+            <a:r>
+              <a:rPr lang="de-CH" dirty="0" err="1"/>
+              <a:t>adventure</a:t>
+            </a:r>
+            <a:r>
+              <a:rPr lang="de-CH" dirty="0"/>
+              <a:t> so </a:t>
+            </a:r>
+            <a:r>
+              <a:rPr lang="de-CH" dirty="0" err="1"/>
+              <a:t>far</a:t>
+            </a:r>
+            <a:endParaRPr lang="de-CH" dirty="0"/>
           </a:p>
           <a:p>
             <a:pPr marL="171450" indent="-171450">
@@ -45920,7 +46456,7 @@
           <a:p>
             <a:fld id="{A92CD3DC-9EE5-4241-A1F9-69B506CAE177}" type="datetime1">
               <a:rPr lang="de-CH" smtClean="0"/>
-              <a:t>11.05.2019</a:t>
+              <a:t>12.05.2019</a:t>
             </a:fld>
             <a:endParaRPr lang="en-US" dirty="0"/>
           </a:p>
@@ -46796,6 +47332,214 @@
       </p:grpSpPr>
       <p:sp>
         <p:nvSpPr>
+          <p:cNvPr id="2" name="Title 1">
+            <a:extLst>
+              <a:ext uri="{FF2B5EF4-FFF2-40B4-BE49-F238E27FC236}">
+                <a16:creationId xmlns:a16="http://schemas.microsoft.com/office/drawing/2014/main" id="{1AD0ED22-A066-4739-87AB-466B65AEF71E}"/>
+              </a:ext>
+            </a:extLst>
+          </p:cNvPr>
+          <p:cNvSpPr>
+            <a:spLocks noGrp="1"/>
+          </p:cNvSpPr>
+          <p:nvPr>
+            <p:ph type="title"/>
+          </p:nvPr>
+        </p:nvSpPr>
+        <p:spPr>
+          <a:xfrm>
+            <a:off x="252918" y="1123837"/>
+            <a:ext cx="3163381" cy="4601183"/>
+          </a:xfrm>
+        </p:spPr>
+        <p:txBody>
+          <a:bodyPr/>
+          <a:lstStyle/>
+          <a:p>
+            <a:r>
+              <a:rPr lang="en-US" dirty="0"/>
+              <a:t>Aggregations</a:t>
+            </a:r>
+            <a:endParaRPr lang="de-CH" dirty="0"/>
+          </a:p>
+        </p:txBody>
+      </p:sp>
+      <p:sp>
+        <p:nvSpPr>
+          <p:cNvPr id="3" name="Date Placeholder 2">
+            <a:extLst>
+              <a:ext uri="{FF2B5EF4-FFF2-40B4-BE49-F238E27FC236}">
+                <a16:creationId xmlns:a16="http://schemas.microsoft.com/office/drawing/2014/main" id="{8CB2E5A9-B7D1-48BB-862F-6E52015D073A}"/>
+              </a:ext>
+            </a:extLst>
+          </p:cNvPr>
+          <p:cNvSpPr>
+            <a:spLocks noGrp="1"/>
+          </p:cNvSpPr>
+          <p:nvPr>
+            <p:ph type="dt" sz="half" idx="10"/>
+          </p:nvPr>
+        </p:nvSpPr>
+        <p:spPr/>
+        <p:txBody>
+          <a:bodyPr/>
+          <a:lstStyle/>
+          <a:p>
+            <a:fld id="{97B7E7BF-8BAF-4B0F-8062-A4798342EA6C}" type="datetime1">
+              <a:rPr lang="de-CH" smtClean="0"/>
+              <a:t>11.05.2019</a:t>
+            </a:fld>
+            <a:endParaRPr lang="en-US" dirty="0"/>
+          </a:p>
+        </p:txBody>
+      </p:sp>
+      <p:sp>
+        <p:nvSpPr>
+          <p:cNvPr id="4" name="Slide Number Placeholder 3">
+            <a:extLst>
+              <a:ext uri="{FF2B5EF4-FFF2-40B4-BE49-F238E27FC236}">
+                <a16:creationId xmlns:a16="http://schemas.microsoft.com/office/drawing/2014/main" id="{EF694106-FECF-4461-BF14-73F514F976C6}"/>
+              </a:ext>
+            </a:extLst>
+          </p:cNvPr>
+          <p:cNvSpPr>
+            <a:spLocks noGrp="1"/>
+          </p:cNvSpPr>
+          <p:nvPr>
+            <p:ph type="sldNum" sz="quarter" idx="12"/>
+          </p:nvPr>
+        </p:nvSpPr>
+        <p:spPr/>
+        <p:txBody>
+          <a:bodyPr/>
+          <a:lstStyle/>
+          <a:p>
+            <a:fld id="{4FAB73BC-B049-4115-A692-8D63A059BFB8}" type="slidenum">
+              <a:rPr lang="en-US" smtClean="0"/>
+              <a:pPr/>
+              <a:t>41</a:t>
+            </a:fld>
+            <a:endParaRPr lang="en-US" dirty="0"/>
+          </a:p>
+        </p:txBody>
+      </p:sp>
+      <p:sp>
+        <p:nvSpPr>
+          <p:cNvPr id="5" name="TextBox 4">
+            <a:extLst>
+              <a:ext uri="{FF2B5EF4-FFF2-40B4-BE49-F238E27FC236}">
+                <a16:creationId xmlns:a16="http://schemas.microsoft.com/office/drawing/2014/main" id="{2CBF8B32-FFD5-44AB-82B7-CDD178911546}"/>
+              </a:ext>
+            </a:extLst>
+          </p:cNvPr>
+          <p:cNvSpPr txBox="1"/>
+          <p:nvPr/>
+        </p:nvSpPr>
+        <p:spPr>
+          <a:xfrm>
+            <a:off x="4521200" y="2832100"/>
+            <a:ext cx="1710661" cy="2031325"/>
+          </a:xfrm>
+          <a:prstGeom prst="rect">
+            <a:avLst/>
+          </a:prstGeom>
+          <a:noFill/>
+        </p:spPr>
+        <p:txBody>
+          <a:bodyPr wrap="none" rtlCol="0">
+            <a:spAutoFit/>
+          </a:bodyPr>
+          <a:lstStyle/>
+          <a:p>
+            <a:pPr marL="285750" indent="-285750">
+              <a:buFontTx/>
+              <a:buChar char="-"/>
+            </a:pPr>
+            <a:r>
+              <a:rPr lang="en-US" dirty="0"/>
+              <a:t>Reduce</a:t>
+            </a:r>
+          </a:p>
+          <a:p>
+            <a:pPr marL="285750" indent="-285750">
+              <a:buFontTx/>
+              <a:buChar char="-"/>
+            </a:pPr>
+            <a:r>
+              <a:rPr lang="en-US" dirty="0"/>
+              <a:t>Aggregate</a:t>
+            </a:r>
+          </a:p>
+          <a:p>
+            <a:pPr marL="285750" indent="-285750">
+              <a:buFontTx/>
+              <a:buChar char="-"/>
+            </a:pPr>
+            <a:r>
+              <a:rPr lang="en-US" dirty="0"/>
+              <a:t>Join</a:t>
+            </a:r>
+          </a:p>
+          <a:p>
+            <a:pPr marL="285750" indent="-285750">
+              <a:buFontTx/>
+              <a:buChar char="-"/>
+            </a:pPr>
+            <a:r>
+              <a:rPr lang="en-US" dirty="0"/>
+              <a:t>Transformers</a:t>
+            </a:r>
+          </a:p>
+          <a:p>
+            <a:pPr marL="285750" indent="-285750">
+              <a:buFontTx/>
+              <a:buChar char="-"/>
+            </a:pPr>
+            <a:r>
+              <a:rPr lang="en-US" dirty="0"/>
+              <a:t>Processors </a:t>
+            </a:r>
+          </a:p>
+          <a:p>
+            <a:endParaRPr lang="en-US" dirty="0"/>
+          </a:p>
+          <a:p>
+            <a:endParaRPr lang="de-CH" dirty="0"/>
+          </a:p>
+        </p:txBody>
+      </p:sp>
+    </p:spTree>
+    <p:extLst>
+      <p:ext uri="{BB962C8B-B14F-4D97-AF65-F5344CB8AC3E}">
+        <p14:creationId xmlns:p14="http://schemas.microsoft.com/office/powerpoint/2010/main" val="1649589561"/>
+      </p:ext>
+    </p:extLst>
+  </p:cSld>
+  <p:clrMapOvr>
+    <a:masterClrMapping/>
+  </p:clrMapOvr>
+</p:sld>
+</file>
+
+<file path=ppt/slides/slide42.xml><?xml version="1.0" encoding="utf-8"?>
+<p:sld xmlns:a="http://schemas.openxmlformats.org/drawingml/2006/main" xmlns:r="http://schemas.openxmlformats.org/officeDocument/2006/relationships" xmlns:p="http://schemas.openxmlformats.org/presentationml/2006/main">
+  <p:cSld>
+    <p:spTree>
+      <p:nvGrpSpPr>
+        <p:cNvPr id="1" name=""/>
+        <p:cNvGrpSpPr/>
+        <p:nvPr/>
+      </p:nvGrpSpPr>
+      <p:grpSpPr>
+        <a:xfrm>
+          <a:off x="0" y="0"/>
+          <a:ext cx="0" cy="0"/>
+          <a:chOff x="0" y="0"/>
+          <a:chExt cx="0" cy="0"/>
+        </a:xfrm>
+      </p:grpSpPr>
+      <p:sp>
+        <p:nvSpPr>
           <p:cNvPr id="2" name="Date Placeholder 1">
             <a:extLst>
               <a:ext uri="{FF2B5EF4-FFF2-40B4-BE49-F238E27FC236}">
@@ -46847,7 +47591,7 @@
             <a:fld id="{4FAB73BC-B049-4115-A692-8D63A059BFB8}" type="slidenum">
               <a:rPr lang="en-US" smtClean="0"/>
               <a:pPr/>
-              <a:t>41</a:t>
+              <a:t>42</a:t>
             </a:fld>
             <a:endParaRPr lang="en-US" dirty="0"/>
           </a:p>
@@ -46913,7 +47657,7 @@
 </p:sld>
 </file>
 
-<file path=ppt/slides/slide42.xml><?xml version="1.0" encoding="utf-8"?>
+<file path=ppt/slides/slide43.xml><?xml version="1.0" encoding="utf-8"?>
 <p:sld xmlns:a="http://schemas.openxmlformats.org/drawingml/2006/main" xmlns:r="http://schemas.openxmlformats.org/officeDocument/2006/relationships" xmlns:p="http://schemas.openxmlformats.org/presentationml/2006/main">
   <p:cSld>
     <p:spTree>
@@ -47016,7 +47760,7 @@
             <a:fld id="{4FAB73BC-B049-4115-A692-8D63A059BFB8}" type="slidenum">
               <a:rPr lang="en-US" smtClean="0"/>
               <a:pPr/>
-              <a:t>42</a:t>
+              <a:t>43</a:t>
             </a:fld>
             <a:endParaRPr lang="en-US" dirty="0"/>
           </a:p>
@@ -47035,7 +47779,7 @@
 </p:sld>
 </file>
 
-<file path=ppt/slides/slide43.xml><?xml version="1.0" encoding="utf-8"?>
+<file path=ppt/slides/slide44.xml><?xml version="1.0" encoding="utf-8"?>
 <p:sld xmlns:a="http://schemas.openxmlformats.org/drawingml/2006/main" xmlns:r="http://schemas.openxmlformats.org/officeDocument/2006/relationships" xmlns:p="http://schemas.openxmlformats.org/presentationml/2006/main">
   <p:cSld>
     <p:spTree>
@@ -47138,7 +47882,7 @@
             <a:fld id="{4FAB73BC-B049-4115-A692-8D63A059BFB8}" type="slidenum">
               <a:rPr lang="en-US" smtClean="0"/>
               <a:pPr/>
-              <a:t>43</a:t>
+              <a:t>44</a:t>
             </a:fld>
             <a:endParaRPr lang="en-US" dirty="0"/>
           </a:p>
@@ -47334,7 +48078,7 @@
 </p:sld>
 </file>
 
-<file path=ppt/slides/slide44.xml><?xml version="1.0" encoding="utf-8"?>
+<file path=ppt/slides/slide45.xml><?xml version="1.0" encoding="utf-8"?>
 <p:sld xmlns:a="http://schemas.openxmlformats.org/drawingml/2006/main" xmlns:r="http://schemas.openxmlformats.org/officeDocument/2006/relationships" xmlns:p="http://schemas.openxmlformats.org/presentationml/2006/main">
   <p:cSld>
     <p:spTree>
@@ -47438,7 +48182,7 @@
             <a:fld id="{4FAB73BC-B049-4115-A692-8D63A059BFB8}" type="slidenum">
               <a:rPr lang="en-US" smtClean="0"/>
               <a:pPr/>
-              <a:t>44</a:t>
+              <a:t>45</a:t>
             </a:fld>
             <a:endParaRPr lang="en-US" dirty="0"/>
           </a:p>
@@ -47503,214 +48247,6 @@
     <p:extLst>
       <p:ext uri="{BB962C8B-B14F-4D97-AF65-F5344CB8AC3E}">
         <p14:creationId xmlns:p14="http://schemas.microsoft.com/office/powerpoint/2010/main" val="21472090"/>
-      </p:ext>
-    </p:extLst>
-  </p:cSld>
-  <p:clrMapOvr>
-    <a:masterClrMapping/>
-  </p:clrMapOvr>
-</p:sld>
-</file>
-
-<file path=ppt/slides/slide45.xml><?xml version="1.0" encoding="utf-8"?>
-<p:sld xmlns:a="http://schemas.openxmlformats.org/drawingml/2006/main" xmlns:r="http://schemas.openxmlformats.org/officeDocument/2006/relationships" xmlns:p="http://schemas.openxmlformats.org/presentationml/2006/main">
-  <p:cSld>
-    <p:spTree>
-      <p:nvGrpSpPr>
-        <p:cNvPr id="1" name=""/>
-        <p:cNvGrpSpPr/>
-        <p:nvPr/>
-      </p:nvGrpSpPr>
-      <p:grpSpPr>
-        <a:xfrm>
-          <a:off x="0" y="0"/>
-          <a:ext cx="0" cy="0"/>
-          <a:chOff x="0" y="0"/>
-          <a:chExt cx="0" cy="0"/>
-        </a:xfrm>
-      </p:grpSpPr>
-      <p:sp>
-        <p:nvSpPr>
-          <p:cNvPr id="2" name="Title 1">
-            <a:extLst>
-              <a:ext uri="{FF2B5EF4-FFF2-40B4-BE49-F238E27FC236}">
-                <a16:creationId xmlns:a16="http://schemas.microsoft.com/office/drawing/2014/main" id="{1AD0ED22-A066-4739-87AB-466B65AEF71E}"/>
-              </a:ext>
-            </a:extLst>
-          </p:cNvPr>
-          <p:cNvSpPr>
-            <a:spLocks noGrp="1"/>
-          </p:cNvSpPr>
-          <p:nvPr>
-            <p:ph type="title"/>
-          </p:nvPr>
-        </p:nvSpPr>
-        <p:spPr>
-          <a:xfrm>
-            <a:off x="252918" y="1123837"/>
-            <a:ext cx="3163381" cy="4601183"/>
-          </a:xfrm>
-        </p:spPr>
-        <p:txBody>
-          <a:bodyPr/>
-          <a:lstStyle/>
-          <a:p>
-            <a:r>
-              <a:rPr lang="en-US" dirty="0"/>
-              <a:t>Aggregations</a:t>
-            </a:r>
-            <a:endParaRPr lang="de-CH" dirty="0"/>
-          </a:p>
-        </p:txBody>
-      </p:sp>
-      <p:sp>
-        <p:nvSpPr>
-          <p:cNvPr id="3" name="Date Placeholder 2">
-            <a:extLst>
-              <a:ext uri="{FF2B5EF4-FFF2-40B4-BE49-F238E27FC236}">
-                <a16:creationId xmlns:a16="http://schemas.microsoft.com/office/drawing/2014/main" id="{8CB2E5A9-B7D1-48BB-862F-6E52015D073A}"/>
-              </a:ext>
-            </a:extLst>
-          </p:cNvPr>
-          <p:cNvSpPr>
-            <a:spLocks noGrp="1"/>
-          </p:cNvSpPr>
-          <p:nvPr>
-            <p:ph type="dt" sz="half" idx="10"/>
-          </p:nvPr>
-        </p:nvSpPr>
-        <p:spPr/>
-        <p:txBody>
-          <a:bodyPr/>
-          <a:lstStyle/>
-          <a:p>
-            <a:fld id="{97B7E7BF-8BAF-4B0F-8062-A4798342EA6C}" type="datetime1">
-              <a:rPr lang="de-CH" smtClean="0"/>
-              <a:t>11.05.2019</a:t>
-            </a:fld>
-            <a:endParaRPr lang="en-US" dirty="0"/>
-          </a:p>
-        </p:txBody>
-      </p:sp>
-      <p:sp>
-        <p:nvSpPr>
-          <p:cNvPr id="4" name="Slide Number Placeholder 3">
-            <a:extLst>
-              <a:ext uri="{FF2B5EF4-FFF2-40B4-BE49-F238E27FC236}">
-                <a16:creationId xmlns:a16="http://schemas.microsoft.com/office/drawing/2014/main" id="{EF694106-FECF-4461-BF14-73F514F976C6}"/>
-              </a:ext>
-            </a:extLst>
-          </p:cNvPr>
-          <p:cNvSpPr>
-            <a:spLocks noGrp="1"/>
-          </p:cNvSpPr>
-          <p:nvPr>
-            <p:ph type="sldNum" sz="quarter" idx="12"/>
-          </p:nvPr>
-        </p:nvSpPr>
-        <p:spPr/>
-        <p:txBody>
-          <a:bodyPr/>
-          <a:lstStyle/>
-          <a:p>
-            <a:fld id="{4FAB73BC-B049-4115-A692-8D63A059BFB8}" type="slidenum">
-              <a:rPr lang="en-US" smtClean="0"/>
-              <a:pPr/>
-              <a:t>45</a:t>
-            </a:fld>
-            <a:endParaRPr lang="en-US" dirty="0"/>
-          </a:p>
-        </p:txBody>
-      </p:sp>
-      <p:sp>
-        <p:nvSpPr>
-          <p:cNvPr id="5" name="TextBox 4">
-            <a:extLst>
-              <a:ext uri="{FF2B5EF4-FFF2-40B4-BE49-F238E27FC236}">
-                <a16:creationId xmlns:a16="http://schemas.microsoft.com/office/drawing/2014/main" id="{2CBF8B32-FFD5-44AB-82B7-CDD178911546}"/>
-              </a:ext>
-            </a:extLst>
-          </p:cNvPr>
-          <p:cNvSpPr txBox="1"/>
-          <p:nvPr/>
-        </p:nvSpPr>
-        <p:spPr>
-          <a:xfrm>
-            <a:off x="4521200" y="2832100"/>
-            <a:ext cx="1710661" cy="2031325"/>
-          </a:xfrm>
-          <a:prstGeom prst="rect">
-            <a:avLst/>
-          </a:prstGeom>
-          <a:noFill/>
-        </p:spPr>
-        <p:txBody>
-          <a:bodyPr wrap="none" rtlCol="0">
-            <a:spAutoFit/>
-          </a:bodyPr>
-          <a:lstStyle/>
-          <a:p>
-            <a:pPr marL="285750" indent="-285750">
-              <a:buFontTx/>
-              <a:buChar char="-"/>
-            </a:pPr>
-            <a:r>
-              <a:rPr lang="en-US" dirty="0"/>
-              <a:t>Reduce</a:t>
-            </a:r>
-          </a:p>
-          <a:p>
-            <a:pPr marL="285750" indent="-285750">
-              <a:buFontTx/>
-              <a:buChar char="-"/>
-            </a:pPr>
-            <a:r>
-              <a:rPr lang="en-US" dirty="0"/>
-              <a:t>Aggregate</a:t>
-            </a:r>
-          </a:p>
-          <a:p>
-            <a:pPr marL="285750" indent="-285750">
-              <a:buFontTx/>
-              <a:buChar char="-"/>
-            </a:pPr>
-            <a:r>
-              <a:rPr lang="en-US" dirty="0"/>
-              <a:t>Join</a:t>
-            </a:r>
-          </a:p>
-          <a:p>
-            <a:pPr marL="285750" indent="-285750">
-              <a:buFontTx/>
-              <a:buChar char="-"/>
-            </a:pPr>
-            <a:r>
-              <a:rPr lang="en-US" dirty="0"/>
-              <a:t>Transformers</a:t>
-            </a:r>
-          </a:p>
-          <a:p>
-            <a:pPr marL="285750" indent="-285750">
-              <a:buFontTx/>
-              <a:buChar char="-"/>
-            </a:pPr>
-            <a:r>
-              <a:rPr lang="en-US" dirty="0"/>
-              <a:t>Processors </a:t>
-            </a:r>
-          </a:p>
-          <a:p>
-            <a:endParaRPr lang="en-US" dirty="0"/>
-          </a:p>
-          <a:p>
-            <a:endParaRPr lang="de-CH" dirty="0"/>
-          </a:p>
-        </p:txBody>
-      </p:sp>
-    </p:spTree>
-    <p:extLst>
-      <p:ext uri="{BB962C8B-B14F-4D97-AF65-F5344CB8AC3E}">
-        <p14:creationId xmlns:p14="http://schemas.microsoft.com/office/powerpoint/2010/main" val="1649589561"/>
       </p:ext>
     </p:extLst>
   </p:cSld>
@@ -47857,6 +48393,1468 @@
       </p:grpSpPr>
       <p:sp>
         <p:nvSpPr>
+          <p:cNvPr id="2" name="Title 1">
+            <a:extLst>
+              <a:ext uri="{FF2B5EF4-FFF2-40B4-BE49-F238E27FC236}">
+                <a16:creationId xmlns:a16="http://schemas.microsoft.com/office/drawing/2014/main" id="{1AD0ED22-A066-4739-87AB-466B65AEF71E}"/>
+              </a:ext>
+            </a:extLst>
+          </p:cNvPr>
+          <p:cNvSpPr>
+            <a:spLocks noGrp="1"/>
+          </p:cNvSpPr>
+          <p:nvPr>
+            <p:ph type="title"/>
+          </p:nvPr>
+        </p:nvSpPr>
+        <p:spPr>
+          <a:xfrm>
+            <a:off x="252918" y="1123837"/>
+            <a:ext cx="3163381" cy="4601183"/>
+          </a:xfrm>
+        </p:spPr>
+        <p:txBody>
+          <a:bodyPr/>
+          <a:lstStyle/>
+          <a:p>
+            <a:r>
+              <a:rPr lang="en-US" dirty="0"/>
+              <a:t>Aggregations</a:t>
+            </a:r>
+            <a:endParaRPr lang="de-CH" dirty="0"/>
+          </a:p>
+        </p:txBody>
+      </p:sp>
+      <p:sp>
+        <p:nvSpPr>
+          <p:cNvPr id="3" name="Date Placeholder 2">
+            <a:extLst>
+              <a:ext uri="{FF2B5EF4-FFF2-40B4-BE49-F238E27FC236}">
+                <a16:creationId xmlns:a16="http://schemas.microsoft.com/office/drawing/2014/main" id="{8CB2E5A9-B7D1-48BB-862F-6E52015D073A}"/>
+              </a:ext>
+            </a:extLst>
+          </p:cNvPr>
+          <p:cNvSpPr>
+            <a:spLocks noGrp="1"/>
+          </p:cNvSpPr>
+          <p:nvPr>
+            <p:ph type="dt" sz="half" idx="10"/>
+          </p:nvPr>
+        </p:nvSpPr>
+        <p:spPr/>
+        <p:txBody>
+          <a:bodyPr/>
+          <a:lstStyle/>
+          <a:p>
+            <a:fld id="{97B7E7BF-8BAF-4B0F-8062-A4798342EA6C}" type="datetime1">
+              <a:rPr lang="de-CH" smtClean="0"/>
+              <a:t>11.05.2019</a:t>
+            </a:fld>
+            <a:endParaRPr lang="en-US" dirty="0"/>
+          </a:p>
+        </p:txBody>
+      </p:sp>
+      <p:sp>
+        <p:nvSpPr>
+          <p:cNvPr id="4" name="Slide Number Placeholder 3">
+            <a:extLst>
+              <a:ext uri="{FF2B5EF4-FFF2-40B4-BE49-F238E27FC236}">
+                <a16:creationId xmlns:a16="http://schemas.microsoft.com/office/drawing/2014/main" id="{EF694106-FECF-4461-BF14-73F514F976C6}"/>
+              </a:ext>
+            </a:extLst>
+          </p:cNvPr>
+          <p:cNvSpPr>
+            <a:spLocks noGrp="1"/>
+          </p:cNvSpPr>
+          <p:nvPr>
+            <p:ph type="sldNum" sz="quarter" idx="12"/>
+          </p:nvPr>
+        </p:nvSpPr>
+        <p:spPr/>
+        <p:txBody>
+          <a:bodyPr/>
+          <a:lstStyle/>
+          <a:p>
+            <a:fld id="{4FAB73BC-B049-4115-A692-8D63A059BFB8}" type="slidenum">
+              <a:rPr lang="en-US" smtClean="0"/>
+              <a:pPr/>
+              <a:t>47</a:t>
+            </a:fld>
+            <a:endParaRPr lang="en-US" dirty="0"/>
+          </a:p>
+        </p:txBody>
+      </p:sp>
+      <p:sp>
+        <p:nvSpPr>
+          <p:cNvPr id="5" name="TextBox 4">
+            <a:extLst>
+              <a:ext uri="{FF2B5EF4-FFF2-40B4-BE49-F238E27FC236}">
+                <a16:creationId xmlns:a16="http://schemas.microsoft.com/office/drawing/2014/main" id="{2CBF8B32-FFD5-44AB-82B7-CDD178911546}"/>
+              </a:ext>
+            </a:extLst>
+          </p:cNvPr>
+          <p:cNvSpPr txBox="1"/>
+          <p:nvPr/>
+        </p:nvSpPr>
+        <p:spPr>
+          <a:xfrm>
+            <a:off x="4521200" y="2832100"/>
+            <a:ext cx="5497980" cy="1200329"/>
+          </a:xfrm>
+          <a:prstGeom prst="rect">
+            <a:avLst/>
+          </a:prstGeom>
+          <a:noFill/>
+        </p:spPr>
+        <p:txBody>
+          <a:bodyPr wrap="none" rtlCol="0">
+            <a:spAutoFit/>
+          </a:bodyPr>
+          <a:lstStyle/>
+          <a:p>
+            <a:pPr marL="285750" indent="-285750">
+              <a:buFontTx/>
+              <a:buChar char="-"/>
+            </a:pPr>
+            <a:r>
+              <a:rPr lang="en-US" dirty="0"/>
+              <a:t>Challenge: MISTAKE: result as list</a:t>
+            </a:r>
+          </a:p>
+          <a:p>
+            <a:pPr marL="285750" indent="-285750">
+              <a:buFontTx/>
+              <a:buChar char="-"/>
+            </a:pPr>
+            <a:r>
+              <a:rPr lang="en-US" dirty="0"/>
+              <a:t>Challenge: MISTAKE: join with global tables – polling</a:t>
+            </a:r>
+          </a:p>
+          <a:p>
+            <a:endParaRPr lang="en-US" dirty="0"/>
+          </a:p>
+          <a:p>
+            <a:endParaRPr lang="de-CH" dirty="0"/>
+          </a:p>
+        </p:txBody>
+      </p:sp>
+    </p:spTree>
+    <p:extLst>
+      <p:ext uri="{BB962C8B-B14F-4D97-AF65-F5344CB8AC3E}">
+        <p14:creationId xmlns:p14="http://schemas.microsoft.com/office/powerpoint/2010/main" val="1320802605"/>
+      </p:ext>
+    </p:extLst>
+  </p:cSld>
+  <p:clrMapOvr>
+    <a:masterClrMapping/>
+  </p:clrMapOvr>
+</p:sld>
+</file>
+
+<file path=ppt/slides/slide48.xml><?xml version="1.0" encoding="utf-8"?>
+<p:sld xmlns:a="http://schemas.openxmlformats.org/drawingml/2006/main" xmlns:r="http://schemas.openxmlformats.org/officeDocument/2006/relationships" xmlns:p="http://schemas.openxmlformats.org/presentationml/2006/main">
+  <p:cSld>
+    <p:spTree>
+      <p:nvGrpSpPr>
+        <p:cNvPr id="1" name=""/>
+        <p:cNvGrpSpPr/>
+        <p:nvPr/>
+      </p:nvGrpSpPr>
+      <p:grpSpPr>
+        <a:xfrm>
+          <a:off x="0" y="0"/>
+          <a:ext cx="0" cy="0"/>
+          <a:chOff x="0" y="0"/>
+          <a:chExt cx="0" cy="0"/>
+        </a:xfrm>
+      </p:grpSpPr>
+      <p:sp>
+        <p:nvSpPr>
+          <p:cNvPr id="2" name="Title 1">
+            <a:extLst>
+              <a:ext uri="{FF2B5EF4-FFF2-40B4-BE49-F238E27FC236}">
+                <a16:creationId xmlns:a16="http://schemas.microsoft.com/office/drawing/2014/main" id="{21628B8C-6622-45A3-B5A7-B65F275EC6E9}"/>
+              </a:ext>
+            </a:extLst>
+          </p:cNvPr>
+          <p:cNvSpPr>
+            <a:spLocks noGrp="1"/>
+          </p:cNvSpPr>
+          <p:nvPr>
+            <p:ph type="title"/>
+          </p:nvPr>
+        </p:nvSpPr>
+        <p:spPr/>
+        <p:txBody>
+          <a:bodyPr/>
+          <a:lstStyle/>
+          <a:p>
+            <a:r>
+              <a:rPr lang="en-US" dirty="0"/>
+              <a:t>How to query?</a:t>
+            </a:r>
+            <a:endParaRPr lang="de-CH" dirty="0"/>
+          </a:p>
+        </p:txBody>
+      </p:sp>
+      <p:sp>
+        <p:nvSpPr>
+          <p:cNvPr id="3" name="Date Placeholder 2">
+            <a:extLst>
+              <a:ext uri="{FF2B5EF4-FFF2-40B4-BE49-F238E27FC236}">
+                <a16:creationId xmlns:a16="http://schemas.microsoft.com/office/drawing/2014/main" id="{69E110A0-72B9-4C56-8952-FD8F2DEEC0C6}"/>
+              </a:ext>
+            </a:extLst>
+          </p:cNvPr>
+          <p:cNvSpPr>
+            <a:spLocks noGrp="1"/>
+          </p:cNvSpPr>
+          <p:nvPr>
+            <p:ph type="dt" sz="half" idx="10"/>
+          </p:nvPr>
+        </p:nvSpPr>
+        <p:spPr/>
+        <p:txBody>
+          <a:bodyPr/>
+          <a:lstStyle/>
+          <a:p>
+            <a:fld id="{97B7E7BF-8BAF-4B0F-8062-A4798342EA6C}" type="datetime1">
+              <a:rPr lang="de-CH" smtClean="0"/>
+              <a:t>11.05.2019</a:t>
+            </a:fld>
+            <a:endParaRPr lang="en-US" dirty="0"/>
+          </a:p>
+        </p:txBody>
+      </p:sp>
+      <p:sp>
+        <p:nvSpPr>
+          <p:cNvPr id="4" name="Slide Number Placeholder 3">
+            <a:extLst>
+              <a:ext uri="{FF2B5EF4-FFF2-40B4-BE49-F238E27FC236}">
+                <a16:creationId xmlns:a16="http://schemas.microsoft.com/office/drawing/2014/main" id="{F78E6526-B4B7-47EB-B465-4F186852C693}"/>
+              </a:ext>
+            </a:extLst>
+          </p:cNvPr>
+          <p:cNvSpPr>
+            <a:spLocks noGrp="1"/>
+          </p:cNvSpPr>
+          <p:nvPr>
+            <p:ph type="sldNum" sz="quarter" idx="12"/>
+          </p:nvPr>
+        </p:nvSpPr>
+        <p:spPr/>
+        <p:txBody>
+          <a:bodyPr/>
+          <a:lstStyle/>
+          <a:p>
+            <a:fld id="{4FAB73BC-B049-4115-A692-8D63A059BFB8}" type="slidenum">
+              <a:rPr lang="en-US" smtClean="0"/>
+              <a:pPr/>
+              <a:t>48</a:t>
+            </a:fld>
+            <a:endParaRPr lang="en-US" dirty="0"/>
+          </a:p>
+        </p:txBody>
+      </p:sp>
+      <p:sp>
+        <p:nvSpPr>
+          <p:cNvPr id="5" name="TextBox 4">
+            <a:extLst>
+              <a:ext uri="{FF2B5EF4-FFF2-40B4-BE49-F238E27FC236}">
+                <a16:creationId xmlns:a16="http://schemas.microsoft.com/office/drawing/2014/main" id="{A8626FA6-8752-4E29-A052-932A62ED47F6}"/>
+              </a:ext>
+            </a:extLst>
+          </p:cNvPr>
+          <p:cNvSpPr txBox="1"/>
+          <p:nvPr/>
+        </p:nvSpPr>
+        <p:spPr>
+          <a:xfrm>
+            <a:off x="4478922" y="1498600"/>
+            <a:ext cx="4074320" cy="1754326"/>
+          </a:xfrm>
+          <a:prstGeom prst="rect">
+            <a:avLst/>
+          </a:prstGeom>
+          <a:noFill/>
+        </p:spPr>
+        <p:txBody>
+          <a:bodyPr wrap="none" rtlCol="0">
+            <a:spAutoFit/>
+          </a:bodyPr>
+          <a:lstStyle/>
+          <a:p>
+            <a:pPr marL="285750" indent="-285750">
+              <a:buFontTx/>
+              <a:buChar char="-"/>
+            </a:pPr>
+            <a:r>
+              <a:rPr lang="en-US" dirty="0"/>
+              <a:t>Problem of .all() for filtering</a:t>
+            </a:r>
+          </a:p>
+          <a:p>
+            <a:pPr marL="285750" indent="-285750">
+              <a:buFontTx/>
+              <a:buChar char="-"/>
+            </a:pPr>
+            <a:r>
+              <a:rPr lang="en-US" dirty="0"/>
+              <a:t>Key range idea – next slide</a:t>
+            </a:r>
+          </a:p>
+          <a:p>
+            <a:pPr marL="285750" indent="-285750">
+              <a:buFontTx/>
+              <a:buChar char="-"/>
+            </a:pPr>
+            <a:r>
+              <a:rPr lang="en-US" dirty="0"/>
+              <a:t>Kafka Connect</a:t>
+            </a:r>
+          </a:p>
+          <a:p>
+            <a:pPr marL="285750" indent="-285750">
+              <a:buFontTx/>
+              <a:buChar char="-"/>
+            </a:pPr>
+            <a:r>
+              <a:rPr lang="en-US" dirty="0"/>
+              <a:t>Direct wrap of Kafka Streams with JPA</a:t>
+            </a:r>
+          </a:p>
+          <a:p>
+            <a:endParaRPr lang="en-US" dirty="0"/>
+          </a:p>
+          <a:p>
+            <a:pPr marL="285750" indent="-285750">
+              <a:buFontTx/>
+              <a:buChar char="-"/>
+            </a:pPr>
+            <a:endParaRPr lang="de-CH" dirty="0"/>
+          </a:p>
+        </p:txBody>
+      </p:sp>
+    </p:spTree>
+    <p:extLst>
+      <p:ext uri="{BB962C8B-B14F-4D97-AF65-F5344CB8AC3E}">
+        <p14:creationId xmlns:p14="http://schemas.microsoft.com/office/powerpoint/2010/main" val="934046466"/>
+      </p:ext>
+    </p:extLst>
+  </p:cSld>
+  <p:clrMapOvr>
+    <a:masterClrMapping/>
+  </p:clrMapOvr>
+</p:sld>
+</file>
+
+<file path=ppt/slides/slide49.xml><?xml version="1.0" encoding="utf-8"?>
+<p:sld xmlns:a="http://schemas.openxmlformats.org/drawingml/2006/main" xmlns:r="http://schemas.openxmlformats.org/officeDocument/2006/relationships" xmlns:p="http://schemas.openxmlformats.org/presentationml/2006/main">
+  <p:cSld>
+    <p:spTree>
+      <p:nvGrpSpPr>
+        <p:cNvPr id="1" name=""/>
+        <p:cNvGrpSpPr/>
+        <p:nvPr/>
+      </p:nvGrpSpPr>
+      <p:grpSpPr>
+        <a:xfrm>
+          <a:off x="0" y="0"/>
+          <a:ext cx="0" cy="0"/>
+          <a:chOff x="0" y="0"/>
+          <a:chExt cx="0" cy="0"/>
+        </a:xfrm>
+      </p:grpSpPr>
+      <p:sp>
+        <p:nvSpPr>
+          <p:cNvPr id="2" name="Title 1">
+            <a:extLst>
+              <a:ext uri="{FF2B5EF4-FFF2-40B4-BE49-F238E27FC236}">
+                <a16:creationId xmlns:a16="http://schemas.microsoft.com/office/drawing/2014/main" id="{21628B8C-6622-45A3-B5A7-B65F275EC6E9}"/>
+              </a:ext>
+            </a:extLst>
+          </p:cNvPr>
+          <p:cNvSpPr>
+            <a:spLocks noGrp="1"/>
+          </p:cNvSpPr>
+          <p:nvPr>
+            <p:ph type="title"/>
+          </p:nvPr>
+        </p:nvSpPr>
+        <p:spPr/>
+        <p:txBody>
+          <a:bodyPr/>
+          <a:lstStyle/>
+          <a:p>
+            <a:r>
+              <a:rPr lang="en-US" dirty="0"/>
+              <a:t>So what is key?</a:t>
+            </a:r>
+            <a:br>
+              <a:rPr lang="en-US" dirty="0"/>
+            </a:br>
+            <a:br>
+              <a:rPr lang="en-US" dirty="0"/>
+            </a:br>
+            <a:r>
+              <a:rPr lang="en-US" dirty="0"/>
+              <a:t>Relationship solution</a:t>
+            </a:r>
+            <a:endParaRPr lang="de-CH" dirty="0"/>
+          </a:p>
+        </p:txBody>
+      </p:sp>
+      <p:sp>
+        <p:nvSpPr>
+          <p:cNvPr id="3" name="Date Placeholder 2">
+            <a:extLst>
+              <a:ext uri="{FF2B5EF4-FFF2-40B4-BE49-F238E27FC236}">
+                <a16:creationId xmlns:a16="http://schemas.microsoft.com/office/drawing/2014/main" id="{69E110A0-72B9-4C56-8952-FD8F2DEEC0C6}"/>
+              </a:ext>
+            </a:extLst>
+          </p:cNvPr>
+          <p:cNvSpPr>
+            <a:spLocks noGrp="1"/>
+          </p:cNvSpPr>
+          <p:nvPr>
+            <p:ph type="dt" sz="half" idx="10"/>
+          </p:nvPr>
+        </p:nvSpPr>
+        <p:spPr/>
+        <p:txBody>
+          <a:bodyPr/>
+          <a:lstStyle/>
+          <a:p>
+            <a:fld id="{97B7E7BF-8BAF-4B0F-8062-A4798342EA6C}" type="datetime1">
+              <a:rPr lang="de-CH" smtClean="0"/>
+              <a:t>11.05.2019</a:t>
+            </a:fld>
+            <a:endParaRPr lang="en-US" dirty="0"/>
+          </a:p>
+        </p:txBody>
+      </p:sp>
+      <p:sp>
+        <p:nvSpPr>
+          <p:cNvPr id="4" name="Slide Number Placeholder 3">
+            <a:extLst>
+              <a:ext uri="{FF2B5EF4-FFF2-40B4-BE49-F238E27FC236}">
+                <a16:creationId xmlns:a16="http://schemas.microsoft.com/office/drawing/2014/main" id="{F78E6526-B4B7-47EB-B465-4F186852C693}"/>
+              </a:ext>
+            </a:extLst>
+          </p:cNvPr>
+          <p:cNvSpPr>
+            <a:spLocks noGrp="1"/>
+          </p:cNvSpPr>
+          <p:nvPr>
+            <p:ph type="sldNum" sz="quarter" idx="12"/>
+          </p:nvPr>
+        </p:nvSpPr>
+        <p:spPr/>
+        <p:txBody>
+          <a:bodyPr/>
+          <a:lstStyle/>
+          <a:p>
+            <a:fld id="{4FAB73BC-B049-4115-A692-8D63A059BFB8}" type="slidenum">
+              <a:rPr lang="en-US" smtClean="0"/>
+              <a:pPr/>
+              <a:t>49</a:t>
+            </a:fld>
+            <a:endParaRPr lang="en-US" dirty="0"/>
+          </a:p>
+        </p:txBody>
+      </p:sp>
+      <p:sp>
+        <p:nvSpPr>
+          <p:cNvPr id="5" name="TextBox 4">
+            <a:extLst>
+              <a:ext uri="{FF2B5EF4-FFF2-40B4-BE49-F238E27FC236}">
+                <a16:creationId xmlns:a16="http://schemas.microsoft.com/office/drawing/2014/main" id="{A8626FA6-8752-4E29-A052-932A62ED47F6}"/>
+              </a:ext>
+            </a:extLst>
+          </p:cNvPr>
+          <p:cNvSpPr txBox="1"/>
+          <p:nvPr/>
+        </p:nvSpPr>
+        <p:spPr>
+          <a:xfrm>
+            <a:off x="4478922" y="1498600"/>
+            <a:ext cx="6621749" cy="3693319"/>
+          </a:xfrm>
+          <a:prstGeom prst="rect">
+            <a:avLst/>
+          </a:prstGeom>
+          <a:noFill/>
+        </p:spPr>
+        <p:txBody>
+          <a:bodyPr wrap="none" rtlCol="0">
+            <a:spAutoFit/>
+          </a:bodyPr>
+          <a:lstStyle/>
+          <a:p>
+            <a:r>
+              <a:rPr lang="en-US" dirty="0" err="1"/>
+              <a:t>organisationUUID</a:t>
+            </a:r>
+            <a:r>
+              <a:rPr lang="en-US" dirty="0"/>
+              <a:t>, then get one row </a:t>
+            </a:r>
+            <a:r>
+              <a:rPr lang="en-US" dirty="0" err="1"/>
+              <a:t>userUUID</a:t>
+            </a:r>
+            <a:r>
+              <a:rPr lang="en-US" dirty="0"/>
+              <a:t> or iterate </a:t>
+            </a:r>
+            <a:r>
+              <a:rPr lang="en-US" dirty="0">
+                <a:sym typeface="Wingdings" panose="05000000000000000000" pitchFamily="2" charset="2"/>
+              </a:rPr>
+              <a:t></a:t>
+            </a:r>
+          </a:p>
+          <a:p>
+            <a:endParaRPr lang="en-US" dirty="0">
+              <a:sym typeface="Wingdings" panose="05000000000000000000" pitchFamily="2" charset="2"/>
+            </a:endParaRPr>
+          </a:p>
+          <a:p>
+            <a:r>
+              <a:rPr lang="en-US" dirty="0">
+                <a:sym typeface="Wingdings" panose="05000000000000000000" pitchFamily="2" charset="2"/>
+              </a:rPr>
+              <a:t>Problem of lists? Problem of iteration?</a:t>
+            </a:r>
+          </a:p>
+          <a:p>
+            <a:endParaRPr lang="en-US" dirty="0">
+              <a:sym typeface="Wingdings" panose="05000000000000000000" pitchFamily="2" charset="2"/>
+            </a:endParaRPr>
+          </a:p>
+          <a:p>
+            <a:r>
+              <a:rPr lang="en-US" dirty="0">
+                <a:sym typeface="Wingdings" panose="05000000000000000000" pitchFamily="2" charset="2"/>
+              </a:rPr>
+              <a:t>vs</a:t>
+            </a:r>
+          </a:p>
+          <a:p>
+            <a:endParaRPr lang="en-US" dirty="0">
+              <a:sym typeface="Wingdings" panose="05000000000000000000" pitchFamily="2" charset="2"/>
+            </a:endParaRPr>
+          </a:p>
+          <a:p>
+            <a:r>
+              <a:rPr lang="en-US" dirty="0">
+                <a:sym typeface="Wingdings" panose="05000000000000000000" pitchFamily="2" charset="2"/>
+              </a:rPr>
+              <a:t>Compound key:</a:t>
+            </a:r>
+          </a:p>
+          <a:p>
+            <a:r>
+              <a:rPr lang="en-US" dirty="0" err="1">
+                <a:sym typeface="Wingdings" panose="05000000000000000000" pitchFamily="2" charset="2"/>
+              </a:rPr>
+              <a:t>organisationUUID:userUUid:positionUuid</a:t>
+            </a:r>
+            <a:endParaRPr lang="en-US" dirty="0">
+              <a:sym typeface="Wingdings" panose="05000000000000000000" pitchFamily="2" charset="2"/>
+            </a:endParaRPr>
+          </a:p>
+          <a:p>
+            <a:endParaRPr lang="en-US" dirty="0">
+              <a:sym typeface="Wingdings" panose="05000000000000000000" pitchFamily="2" charset="2"/>
+            </a:endParaRPr>
+          </a:p>
+          <a:p>
+            <a:endParaRPr lang="en-US" dirty="0">
+              <a:sym typeface="Wingdings" panose="05000000000000000000" pitchFamily="2" charset="2"/>
+            </a:endParaRPr>
+          </a:p>
+          <a:p>
+            <a:r>
+              <a:rPr lang="en-US" dirty="0">
+                <a:sym typeface="Wingdings" panose="05000000000000000000" pitchFamily="2" charset="2"/>
+              </a:rPr>
+              <a:t>TASK:</a:t>
+            </a:r>
+          </a:p>
+          <a:p>
+            <a:r>
+              <a:rPr lang="en-US" dirty="0">
+                <a:sym typeface="Wingdings" panose="05000000000000000000" pitchFamily="2" charset="2"/>
+              </a:rPr>
+              <a:t>Give me all users for organization! How is it with both approaches?</a:t>
+            </a:r>
+            <a:endParaRPr lang="en-US" dirty="0"/>
+          </a:p>
+          <a:p>
+            <a:pPr marL="285750" indent="-285750">
+              <a:buFontTx/>
+              <a:buChar char="-"/>
+            </a:pPr>
+            <a:endParaRPr lang="de-CH" dirty="0"/>
+          </a:p>
+        </p:txBody>
+      </p:sp>
+    </p:spTree>
+    <p:extLst>
+      <p:ext uri="{BB962C8B-B14F-4D97-AF65-F5344CB8AC3E}">
+        <p14:creationId xmlns:p14="http://schemas.microsoft.com/office/powerpoint/2010/main" val="1915667348"/>
+      </p:ext>
+    </p:extLst>
+  </p:cSld>
+  <p:clrMapOvr>
+    <a:masterClrMapping/>
+  </p:clrMapOvr>
+</p:sld>
+</file>
+
+<file path=ppt/slides/slide5.xml><?xml version="1.0" encoding="utf-8"?>
+<p:sld xmlns:a="http://schemas.openxmlformats.org/drawingml/2006/main" xmlns:r="http://schemas.openxmlformats.org/officeDocument/2006/relationships" xmlns:p="http://schemas.openxmlformats.org/presentationml/2006/main">
+  <p:cSld>
+    <p:spTree>
+      <p:nvGrpSpPr>
+        <p:cNvPr id="1" name=""/>
+        <p:cNvGrpSpPr/>
+        <p:nvPr/>
+      </p:nvGrpSpPr>
+      <p:grpSpPr>
+        <a:xfrm>
+          <a:off x="0" y="0"/>
+          <a:ext cx="0" cy="0"/>
+          <a:chOff x="0" y="0"/>
+          <a:chExt cx="0" cy="0"/>
+        </a:xfrm>
+      </p:grpSpPr>
+      <p:sp>
+        <p:nvSpPr>
+          <p:cNvPr id="2" name="Date Placeholder 1">
+            <a:extLst>
+              <a:ext uri="{FF2B5EF4-FFF2-40B4-BE49-F238E27FC236}">
+                <a16:creationId xmlns:a16="http://schemas.microsoft.com/office/drawing/2014/main" id="{48CB98E7-DD60-47E0-A859-9F7EF1862127}"/>
+              </a:ext>
+            </a:extLst>
+          </p:cNvPr>
+          <p:cNvSpPr>
+            <a:spLocks noGrp="1"/>
+          </p:cNvSpPr>
+          <p:nvPr>
+            <p:ph type="dt" sz="half" idx="10"/>
+          </p:nvPr>
+        </p:nvSpPr>
+        <p:spPr/>
+        <p:txBody>
+          <a:bodyPr/>
+          <a:lstStyle/>
+          <a:p>
+            <a:fld id="{A92CD3DC-9EE5-4241-A1F9-69B506CAE177}" type="datetime1">
+              <a:rPr lang="de-CH" smtClean="0"/>
+              <a:t>11.05.2019</a:t>
+            </a:fld>
+            <a:endParaRPr lang="en-US" dirty="0"/>
+          </a:p>
+        </p:txBody>
+      </p:sp>
+      <p:sp>
+        <p:nvSpPr>
+          <p:cNvPr id="3" name="Slide Number Placeholder 2">
+            <a:extLst>
+              <a:ext uri="{FF2B5EF4-FFF2-40B4-BE49-F238E27FC236}">
+                <a16:creationId xmlns:a16="http://schemas.microsoft.com/office/drawing/2014/main" id="{DD155966-8EA5-4F71-9F28-09FA26CAE5A0}"/>
+              </a:ext>
+            </a:extLst>
+          </p:cNvPr>
+          <p:cNvSpPr>
+            <a:spLocks noGrp="1"/>
+          </p:cNvSpPr>
+          <p:nvPr>
+            <p:ph type="sldNum" sz="quarter" idx="12"/>
+          </p:nvPr>
+        </p:nvSpPr>
+        <p:spPr/>
+        <p:txBody>
+          <a:bodyPr/>
+          <a:lstStyle/>
+          <a:p>
+            <a:fld id="{4FAB73BC-B049-4115-A692-8D63A059BFB8}" type="slidenum">
+              <a:rPr lang="en-US" smtClean="0"/>
+              <a:pPr/>
+              <a:t>5</a:t>
+            </a:fld>
+            <a:endParaRPr lang="en-US" dirty="0"/>
+          </a:p>
+        </p:txBody>
+      </p:sp>
+      <p:sp>
+        <p:nvSpPr>
+          <p:cNvPr id="4" name="Content Placeholder 3">
+            <a:extLst>
+              <a:ext uri="{FF2B5EF4-FFF2-40B4-BE49-F238E27FC236}">
+                <a16:creationId xmlns:a16="http://schemas.microsoft.com/office/drawing/2014/main" id="{CD9C6660-F24D-47B4-9642-20FD7CC82BE2}"/>
+              </a:ext>
+            </a:extLst>
+          </p:cNvPr>
+          <p:cNvSpPr>
+            <a:spLocks noGrp="1"/>
+          </p:cNvSpPr>
+          <p:nvPr>
+            <p:ph sz="quarter" idx="13"/>
+          </p:nvPr>
+        </p:nvSpPr>
+        <p:spPr/>
+        <p:txBody>
+          <a:bodyPr/>
+          <a:lstStyle/>
+          <a:p>
+            <a:pPr algn="l"/>
+            <a:r>
+              <a:rPr lang="en-US" dirty="0"/>
+              <a:t>Bank application:</a:t>
+            </a:r>
+          </a:p>
+          <a:p>
+            <a:pPr lvl="1" algn="l"/>
+            <a:r>
+              <a:rPr lang="en-US" dirty="0"/>
+              <a:t>Manage Users</a:t>
+            </a:r>
+          </a:p>
+          <a:p>
+            <a:pPr lvl="1" algn="l"/>
+            <a:r>
+              <a:rPr lang="en-US" dirty="0"/>
+              <a:t>Manage Transactions</a:t>
+            </a:r>
+          </a:p>
+          <a:p>
+            <a:pPr lvl="1" algn="l"/>
+            <a:r>
+              <a:rPr lang="en-US" dirty="0"/>
+              <a:t>Have all history of system for auditing</a:t>
+            </a:r>
+          </a:p>
+          <a:p>
+            <a:pPr lvl="1" algn="l"/>
+            <a:r>
+              <a:rPr lang="en-US" dirty="0"/>
+              <a:t>Additionally: monitoring tools and statistics</a:t>
+            </a:r>
+          </a:p>
+          <a:p>
+            <a:pPr algn="l"/>
+            <a:endParaRPr lang="en-US" dirty="0"/>
+          </a:p>
+        </p:txBody>
+      </p:sp>
+      <p:sp>
+        <p:nvSpPr>
+          <p:cNvPr id="5" name="Title 4">
+            <a:extLst>
+              <a:ext uri="{FF2B5EF4-FFF2-40B4-BE49-F238E27FC236}">
+                <a16:creationId xmlns:a16="http://schemas.microsoft.com/office/drawing/2014/main" id="{AC1CD463-82EF-48C5-B62A-FBAFE04BA805}"/>
+              </a:ext>
+            </a:extLst>
+          </p:cNvPr>
+          <p:cNvSpPr>
+            <a:spLocks noGrp="1"/>
+          </p:cNvSpPr>
+          <p:nvPr>
+            <p:ph type="title"/>
+          </p:nvPr>
+        </p:nvSpPr>
+        <p:spPr/>
+        <p:txBody>
+          <a:bodyPr/>
+          <a:lstStyle/>
+          <a:p>
+            <a:r>
+              <a:rPr lang="en-US" dirty="0"/>
+              <a:t>1. Our use case</a:t>
+            </a:r>
+            <a:endParaRPr lang="de-CH" dirty="0"/>
+          </a:p>
+        </p:txBody>
+      </p:sp>
+    </p:spTree>
+    <p:extLst>
+      <p:ext uri="{BB962C8B-B14F-4D97-AF65-F5344CB8AC3E}">
+        <p14:creationId xmlns:p14="http://schemas.microsoft.com/office/powerpoint/2010/main" val="4225473306"/>
+      </p:ext>
+    </p:extLst>
+  </p:cSld>
+  <p:clrMapOvr>
+    <a:masterClrMapping/>
+  </p:clrMapOvr>
+</p:sld>
+</file>
+
+<file path=ppt/slides/slide50.xml><?xml version="1.0" encoding="utf-8"?>
+<p:sld xmlns:a="http://schemas.openxmlformats.org/drawingml/2006/main" xmlns:r="http://schemas.openxmlformats.org/officeDocument/2006/relationships" xmlns:p="http://schemas.openxmlformats.org/presentationml/2006/main">
+  <p:cSld>
+    <p:spTree>
+      <p:nvGrpSpPr>
+        <p:cNvPr id="1" name=""/>
+        <p:cNvGrpSpPr/>
+        <p:nvPr/>
+      </p:nvGrpSpPr>
+      <p:grpSpPr>
+        <a:xfrm>
+          <a:off x="0" y="0"/>
+          <a:ext cx="0" cy="0"/>
+          <a:chOff x="0" y="0"/>
+          <a:chExt cx="0" cy="0"/>
+        </a:xfrm>
+      </p:grpSpPr>
+      <p:sp>
+        <p:nvSpPr>
+          <p:cNvPr id="2" name="Title 1">
+            <a:extLst>
+              <a:ext uri="{FF2B5EF4-FFF2-40B4-BE49-F238E27FC236}">
+                <a16:creationId xmlns:a16="http://schemas.microsoft.com/office/drawing/2014/main" id="{774EF505-A460-4D36-8E05-9EEB7085DF24}"/>
+              </a:ext>
+            </a:extLst>
+          </p:cNvPr>
+          <p:cNvSpPr>
+            <a:spLocks noGrp="1"/>
+          </p:cNvSpPr>
+          <p:nvPr>
+            <p:ph type="title"/>
+          </p:nvPr>
+        </p:nvSpPr>
+        <p:spPr/>
+        <p:txBody>
+          <a:bodyPr/>
+          <a:lstStyle/>
+          <a:p>
+            <a:r>
+              <a:rPr lang="en-US" dirty="0"/>
+              <a:t>Start stop loops</a:t>
+            </a:r>
+            <a:endParaRPr lang="de-CH" dirty="0"/>
+          </a:p>
+        </p:txBody>
+      </p:sp>
+      <p:sp>
+        <p:nvSpPr>
+          <p:cNvPr id="3" name="Date Placeholder 2">
+            <a:extLst>
+              <a:ext uri="{FF2B5EF4-FFF2-40B4-BE49-F238E27FC236}">
+                <a16:creationId xmlns:a16="http://schemas.microsoft.com/office/drawing/2014/main" id="{A81489DE-02CB-410F-A982-2D60C25D7C00}"/>
+              </a:ext>
+            </a:extLst>
+          </p:cNvPr>
+          <p:cNvSpPr>
+            <a:spLocks noGrp="1"/>
+          </p:cNvSpPr>
+          <p:nvPr>
+            <p:ph type="dt" sz="half" idx="10"/>
+          </p:nvPr>
+        </p:nvSpPr>
+        <p:spPr/>
+        <p:txBody>
+          <a:bodyPr/>
+          <a:lstStyle/>
+          <a:p>
+            <a:fld id="{97B7E7BF-8BAF-4B0F-8062-A4798342EA6C}" type="datetime1">
+              <a:rPr lang="de-CH" smtClean="0"/>
+              <a:t>11.05.2019</a:t>
+            </a:fld>
+            <a:endParaRPr lang="en-US" dirty="0"/>
+          </a:p>
+        </p:txBody>
+      </p:sp>
+      <p:sp>
+        <p:nvSpPr>
+          <p:cNvPr id="4" name="Slide Number Placeholder 3">
+            <a:extLst>
+              <a:ext uri="{FF2B5EF4-FFF2-40B4-BE49-F238E27FC236}">
+                <a16:creationId xmlns:a16="http://schemas.microsoft.com/office/drawing/2014/main" id="{D0ADC00F-DEBA-426B-8F96-ADFA1AC6D014}"/>
+              </a:ext>
+            </a:extLst>
+          </p:cNvPr>
+          <p:cNvSpPr>
+            <a:spLocks noGrp="1"/>
+          </p:cNvSpPr>
+          <p:nvPr>
+            <p:ph type="sldNum" sz="quarter" idx="12"/>
+          </p:nvPr>
+        </p:nvSpPr>
+        <p:spPr/>
+        <p:txBody>
+          <a:bodyPr/>
+          <a:lstStyle/>
+          <a:p>
+            <a:fld id="{4FAB73BC-B049-4115-A692-8D63A059BFB8}" type="slidenum">
+              <a:rPr lang="en-US" smtClean="0"/>
+              <a:pPr/>
+              <a:t>50</a:t>
+            </a:fld>
+            <a:endParaRPr lang="en-US" dirty="0"/>
+          </a:p>
+        </p:txBody>
+      </p:sp>
+      <p:sp>
+        <p:nvSpPr>
+          <p:cNvPr id="5" name="TextBox 4">
+            <a:extLst>
+              <a:ext uri="{FF2B5EF4-FFF2-40B4-BE49-F238E27FC236}">
+                <a16:creationId xmlns:a16="http://schemas.microsoft.com/office/drawing/2014/main" id="{6EC0916A-68EB-4F76-8C68-E4EB4C7B13DD}"/>
+              </a:ext>
+            </a:extLst>
+          </p:cNvPr>
+          <p:cNvSpPr txBox="1"/>
+          <p:nvPr/>
+        </p:nvSpPr>
+        <p:spPr>
+          <a:xfrm>
+            <a:off x="4419600" y="1993900"/>
+            <a:ext cx="2754472" cy="646331"/>
+          </a:xfrm>
+          <a:prstGeom prst="rect">
+            <a:avLst/>
+          </a:prstGeom>
+          <a:noFill/>
+        </p:spPr>
+        <p:txBody>
+          <a:bodyPr wrap="none" rtlCol="0">
+            <a:spAutoFit/>
+          </a:bodyPr>
+          <a:lstStyle/>
+          <a:p>
+            <a:r>
+              <a:rPr lang="en-US" dirty="0"/>
+              <a:t>- What kind of exceptions?</a:t>
+            </a:r>
+          </a:p>
+          <a:p>
+            <a:r>
+              <a:rPr lang="en-US" dirty="0"/>
+              <a:t>- Dead letter queues?  </a:t>
+            </a:r>
+            <a:endParaRPr lang="de-CH" dirty="0"/>
+          </a:p>
+        </p:txBody>
+      </p:sp>
+    </p:spTree>
+    <p:extLst>
+      <p:ext uri="{BB962C8B-B14F-4D97-AF65-F5344CB8AC3E}">
+        <p14:creationId xmlns:p14="http://schemas.microsoft.com/office/powerpoint/2010/main" val="877000401"/>
+      </p:ext>
+    </p:extLst>
+  </p:cSld>
+  <p:clrMapOvr>
+    <a:masterClrMapping/>
+  </p:clrMapOvr>
+</p:sld>
+</file>
+
+<file path=ppt/slides/slide51.xml><?xml version="1.0" encoding="utf-8"?>
+<p:sld xmlns:a="http://schemas.openxmlformats.org/drawingml/2006/main" xmlns:r="http://schemas.openxmlformats.org/officeDocument/2006/relationships" xmlns:p="http://schemas.openxmlformats.org/presentationml/2006/main">
+  <p:cSld>
+    <p:spTree>
+      <p:nvGrpSpPr>
+        <p:cNvPr id="1" name=""/>
+        <p:cNvGrpSpPr/>
+        <p:nvPr/>
+      </p:nvGrpSpPr>
+      <p:grpSpPr>
+        <a:xfrm>
+          <a:off x="0" y="0"/>
+          <a:ext cx="0" cy="0"/>
+          <a:chOff x="0" y="0"/>
+          <a:chExt cx="0" cy="0"/>
+        </a:xfrm>
+      </p:grpSpPr>
+      <p:sp>
+        <p:nvSpPr>
+          <p:cNvPr id="2" name="Title 1">
+            <a:extLst>
+              <a:ext uri="{FF2B5EF4-FFF2-40B4-BE49-F238E27FC236}">
+                <a16:creationId xmlns:a16="http://schemas.microsoft.com/office/drawing/2014/main" id="{9A2F7395-2F24-4BF9-AE6B-96288D91D783}"/>
+              </a:ext>
+            </a:extLst>
+          </p:cNvPr>
+          <p:cNvSpPr>
+            <a:spLocks noGrp="1"/>
+          </p:cNvSpPr>
+          <p:nvPr>
+            <p:ph type="title"/>
+          </p:nvPr>
+        </p:nvSpPr>
+        <p:spPr/>
+        <p:txBody>
+          <a:bodyPr/>
+          <a:lstStyle/>
+          <a:p>
+            <a:r>
+              <a:rPr lang="en-US" dirty="0"/>
+              <a:t>How to do transactions?</a:t>
+            </a:r>
+            <a:endParaRPr lang="de-CH" dirty="0"/>
+          </a:p>
+        </p:txBody>
+      </p:sp>
+      <p:sp>
+        <p:nvSpPr>
+          <p:cNvPr id="3" name="Date Placeholder 2">
+            <a:extLst>
+              <a:ext uri="{FF2B5EF4-FFF2-40B4-BE49-F238E27FC236}">
+                <a16:creationId xmlns:a16="http://schemas.microsoft.com/office/drawing/2014/main" id="{1203E256-73A9-432C-9C80-B8C75A6A1BC6}"/>
+              </a:ext>
+            </a:extLst>
+          </p:cNvPr>
+          <p:cNvSpPr>
+            <a:spLocks noGrp="1"/>
+          </p:cNvSpPr>
+          <p:nvPr>
+            <p:ph type="dt" sz="half" idx="10"/>
+          </p:nvPr>
+        </p:nvSpPr>
+        <p:spPr/>
+        <p:txBody>
+          <a:bodyPr/>
+          <a:lstStyle/>
+          <a:p>
+            <a:fld id="{97B7E7BF-8BAF-4B0F-8062-A4798342EA6C}" type="datetime1">
+              <a:rPr lang="de-CH" smtClean="0"/>
+              <a:t>11.05.2019</a:t>
+            </a:fld>
+            <a:endParaRPr lang="en-US" dirty="0"/>
+          </a:p>
+        </p:txBody>
+      </p:sp>
+      <p:sp>
+        <p:nvSpPr>
+          <p:cNvPr id="4" name="Slide Number Placeholder 3">
+            <a:extLst>
+              <a:ext uri="{FF2B5EF4-FFF2-40B4-BE49-F238E27FC236}">
+                <a16:creationId xmlns:a16="http://schemas.microsoft.com/office/drawing/2014/main" id="{25941B95-5414-4D41-BA19-5BDE855BBDF8}"/>
+              </a:ext>
+            </a:extLst>
+          </p:cNvPr>
+          <p:cNvSpPr>
+            <a:spLocks noGrp="1"/>
+          </p:cNvSpPr>
+          <p:nvPr>
+            <p:ph type="sldNum" sz="quarter" idx="12"/>
+          </p:nvPr>
+        </p:nvSpPr>
+        <p:spPr/>
+        <p:txBody>
+          <a:bodyPr/>
+          <a:lstStyle/>
+          <a:p>
+            <a:fld id="{4FAB73BC-B049-4115-A692-8D63A059BFB8}" type="slidenum">
+              <a:rPr lang="en-US" smtClean="0"/>
+              <a:pPr/>
+              <a:t>51</a:t>
+            </a:fld>
+            <a:endParaRPr lang="en-US" dirty="0"/>
+          </a:p>
+        </p:txBody>
+      </p:sp>
+      <p:sp>
+        <p:nvSpPr>
+          <p:cNvPr id="5" name="TextBox 4">
+            <a:extLst>
+              <a:ext uri="{FF2B5EF4-FFF2-40B4-BE49-F238E27FC236}">
+                <a16:creationId xmlns:a16="http://schemas.microsoft.com/office/drawing/2014/main" id="{4258E892-4660-49CB-9388-AEBDAEFDD0EB}"/>
+              </a:ext>
+            </a:extLst>
+          </p:cNvPr>
+          <p:cNvSpPr txBox="1"/>
+          <p:nvPr/>
+        </p:nvSpPr>
+        <p:spPr>
+          <a:xfrm>
+            <a:off x="4622800" y="1562100"/>
+            <a:ext cx="3414909" cy="923330"/>
+          </a:xfrm>
+          <a:prstGeom prst="rect">
+            <a:avLst/>
+          </a:prstGeom>
+          <a:noFill/>
+        </p:spPr>
+        <p:txBody>
+          <a:bodyPr wrap="none" rtlCol="0">
+            <a:spAutoFit/>
+          </a:bodyPr>
+          <a:lstStyle/>
+          <a:p>
+            <a:pPr marL="285750" indent="-285750">
+              <a:buFontTx/>
+              <a:buChar char="-"/>
+            </a:pPr>
+            <a:r>
+              <a:rPr lang="en-US" dirty="0"/>
+              <a:t>Transactions for Kafka: rollback</a:t>
+            </a:r>
+          </a:p>
+          <a:p>
+            <a:pPr marL="285750" indent="-285750">
+              <a:buFontTx/>
+              <a:buChar char="-"/>
+            </a:pPr>
+            <a:r>
+              <a:rPr lang="en-US" dirty="0"/>
+              <a:t>Direct producers</a:t>
+            </a:r>
+          </a:p>
+          <a:p>
+            <a:pPr marL="285750" indent="-285750">
+              <a:buFontTx/>
+              <a:buChar char="-"/>
+            </a:pPr>
+            <a:r>
+              <a:rPr lang="en-US" dirty="0"/>
+              <a:t>External calls as last step</a:t>
+            </a:r>
+            <a:endParaRPr lang="de-CH" dirty="0"/>
+          </a:p>
+        </p:txBody>
+      </p:sp>
+    </p:spTree>
+    <p:extLst>
+      <p:ext uri="{BB962C8B-B14F-4D97-AF65-F5344CB8AC3E}">
+        <p14:creationId xmlns:p14="http://schemas.microsoft.com/office/powerpoint/2010/main" val="3995027513"/>
+      </p:ext>
+    </p:extLst>
+  </p:cSld>
+  <p:clrMapOvr>
+    <a:masterClrMapping/>
+  </p:clrMapOvr>
+</p:sld>
+</file>
+
+<file path=ppt/slides/slide52.xml><?xml version="1.0" encoding="utf-8"?>
+<p:sld xmlns:a="http://schemas.openxmlformats.org/drawingml/2006/main" xmlns:r="http://schemas.openxmlformats.org/officeDocument/2006/relationships" xmlns:p="http://schemas.openxmlformats.org/presentationml/2006/main">
+  <p:cSld>
+    <p:spTree>
+      <p:nvGrpSpPr>
+        <p:cNvPr id="1" name=""/>
+        <p:cNvGrpSpPr/>
+        <p:nvPr/>
+      </p:nvGrpSpPr>
+      <p:grpSpPr>
+        <a:xfrm>
+          <a:off x="0" y="0"/>
+          <a:ext cx="0" cy="0"/>
+          <a:chOff x="0" y="0"/>
+          <a:chExt cx="0" cy="0"/>
+        </a:xfrm>
+      </p:grpSpPr>
+      <p:sp>
+        <p:nvSpPr>
+          <p:cNvPr id="2" name="Date Placeholder 1">
+            <a:extLst>
+              <a:ext uri="{FF2B5EF4-FFF2-40B4-BE49-F238E27FC236}">
+                <a16:creationId xmlns:a16="http://schemas.microsoft.com/office/drawing/2014/main" id="{48CB98E7-DD60-47E0-A859-9F7EF1862127}"/>
+              </a:ext>
+            </a:extLst>
+          </p:cNvPr>
+          <p:cNvSpPr>
+            <a:spLocks noGrp="1"/>
+          </p:cNvSpPr>
+          <p:nvPr>
+            <p:ph type="dt" sz="half" idx="10"/>
+          </p:nvPr>
+        </p:nvSpPr>
+        <p:spPr/>
+        <p:txBody>
+          <a:bodyPr/>
+          <a:lstStyle/>
+          <a:p>
+            <a:fld id="{A92CD3DC-9EE5-4241-A1F9-69B506CAE177}" type="datetime1">
+              <a:rPr lang="de-CH" smtClean="0"/>
+              <a:t>11.05.2019</a:t>
+            </a:fld>
+            <a:endParaRPr lang="en-US" dirty="0"/>
+          </a:p>
+        </p:txBody>
+      </p:sp>
+      <p:sp>
+        <p:nvSpPr>
+          <p:cNvPr id="3" name="Slide Number Placeholder 2">
+            <a:extLst>
+              <a:ext uri="{FF2B5EF4-FFF2-40B4-BE49-F238E27FC236}">
+                <a16:creationId xmlns:a16="http://schemas.microsoft.com/office/drawing/2014/main" id="{DD155966-8EA5-4F71-9F28-09FA26CAE5A0}"/>
+              </a:ext>
+            </a:extLst>
+          </p:cNvPr>
+          <p:cNvSpPr>
+            <a:spLocks noGrp="1"/>
+          </p:cNvSpPr>
+          <p:nvPr>
+            <p:ph type="sldNum" sz="quarter" idx="12"/>
+          </p:nvPr>
+        </p:nvSpPr>
+        <p:spPr/>
+        <p:txBody>
+          <a:bodyPr/>
+          <a:lstStyle/>
+          <a:p>
+            <a:fld id="{4FAB73BC-B049-4115-A692-8D63A059BFB8}" type="slidenum">
+              <a:rPr lang="en-US" smtClean="0"/>
+              <a:pPr/>
+              <a:t>52</a:t>
+            </a:fld>
+            <a:endParaRPr lang="en-US" dirty="0"/>
+          </a:p>
+        </p:txBody>
+      </p:sp>
+      <p:pic>
+        <p:nvPicPr>
+          <p:cNvPr id="6" name="Content Placeholder 5">
+            <a:extLst>
+              <a:ext uri="{FF2B5EF4-FFF2-40B4-BE49-F238E27FC236}">
+                <a16:creationId xmlns:a16="http://schemas.microsoft.com/office/drawing/2014/main" id="{D91AE75D-47E8-4E90-97D7-2F325E25B28E}"/>
+              </a:ext>
+            </a:extLst>
+          </p:cNvPr>
+          <p:cNvPicPr>
+            <a:picLocks noGrp="1" noChangeAspect="1"/>
+          </p:cNvPicPr>
+          <p:nvPr>
+            <p:ph sz="quarter" idx="13"/>
+          </p:nvPr>
+        </p:nvPicPr>
+        <p:blipFill>
+          <a:blip r:embed="rId3"/>
+          <a:stretch>
+            <a:fillRect/>
+          </a:stretch>
+        </p:blipFill>
+        <p:spPr>
+          <a:xfrm>
+            <a:off x="117586" y="1332963"/>
+            <a:ext cx="11992260" cy="4018209"/>
+          </a:xfrm>
+          <a:prstGeom prst="rect">
+            <a:avLst/>
+          </a:prstGeom>
+        </p:spPr>
+      </p:pic>
+      <p:sp>
+        <p:nvSpPr>
+          <p:cNvPr id="5" name="Title 4">
+            <a:extLst>
+              <a:ext uri="{FF2B5EF4-FFF2-40B4-BE49-F238E27FC236}">
+                <a16:creationId xmlns:a16="http://schemas.microsoft.com/office/drawing/2014/main" id="{AC1CD463-82EF-48C5-B62A-FBAFE04BA805}"/>
+              </a:ext>
+            </a:extLst>
+          </p:cNvPr>
+          <p:cNvSpPr>
+            <a:spLocks noGrp="1"/>
+          </p:cNvSpPr>
+          <p:nvPr>
+            <p:ph type="title"/>
+          </p:nvPr>
+        </p:nvSpPr>
+        <p:spPr/>
+        <p:txBody>
+          <a:bodyPr/>
+          <a:lstStyle/>
+          <a:p>
+            <a:r>
+              <a:rPr lang="en-US" dirty="0"/>
+              <a:t>6. Deployment</a:t>
+            </a:r>
+            <a:endParaRPr lang="de-CH" dirty="0"/>
+          </a:p>
+        </p:txBody>
+      </p:sp>
+      <p:sp>
+        <p:nvSpPr>
+          <p:cNvPr id="4" name="TextBox 3">
+            <a:extLst>
+              <a:ext uri="{FF2B5EF4-FFF2-40B4-BE49-F238E27FC236}">
+                <a16:creationId xmlns:a16="http://schemas.microsoft.com/office/drawing/2014/main" id="{FE136543-3920-4F5A-92C2-95682807738A}"/>
+              </a:ext>
+            </a:extLst>
+          </p:cNvPr>
+          <p:cNvSpPr txBox="1"/>
+          <p:nvPr/>
+        </p:nvSpPr>
+        <p:spPr>
+          <a:xfrm>
+            <a:off x="491802" y="5833641"/>
+            <a:ext cx="2151743" cy="369332"/>
+          </a:xfrm>
+          <a:prstGeom prst="rect">
+            <a:avLst/>
+          </a:prstGeom>
+          <a:noFill/>
+        </p:spPr>
+        <p:txBody>
+          <a:bodyPr wrap="none" rtlCol="0">
+            <a:spAutoFit/>
+          </a:bodyPr>
+          <a:lstStyle/>
+          <a:p>
+            <a:r>
+              <a:rPr lang="en-US" dirty="0"/>
+              <a:t>+ topic autocreation</a:t>
+            </a:r>
+            <a:endParaRPr lang="de-CH" dirty="0"/>
+          </a:p>
+        </p:txBody>
+      </p:sp>
+    </p:spTree>
+    <p:extLst>
+      <p:ext uri="{BB962C8B-B14F-4D97-AF65-F5344CB8AC3E}">
+        <p14:creationId xmlns:p14="http://schemas.microsoft.com/office/powerpoint/2010/main" val="2866946202"/>
+      </p:ext>
+    </p:extLst>
+  </p:cSld>
+  <p:clrMapOvr>
+    <a:masterClrMapping/>
+  </p:clrMapOvr>
+</p:sld>
+</file>
+
+<file path=ppt/slides/slide53.xml><?xml version="1.0" encoding="utf-8"?>
+<p:sld xmlns:a="http://schemas.openxmlformats.org/drawingml/2006/main" xmlns:r="http://schemas.openxmlformats.org/officeDocument/2006/relationships" xmlns:p="http://schemas.openxmlformats.org/presentationml/2006/main">
+  <p:cSld>
+    <p:spTree>
+      <p:nvGrpSpPr>
+        <p:cNvPr id="1" name=""/>
+        <p:cNvGrpSpPr/>
+        <p:nvPr/>
+      </p:nvGrpSpPr>
+      <p:grpSpPr>
+        <a:xfrm>
+          <a:off x="0" y="0"/>
+          <a:ext cx="0" cy="0"/>
+          <a:chOff x="0" y="0"/>
+          <a:chExt cx="0" cy="0"/>
+        </a:xfrm>
+      </p:grpSpPr>
+      <p:sp>
+        <p:nvSpPr>
+          <p:cNvPr id="2" name="Date Placeholder 1">
+            <a:extLst>
+              <a:ext uri="{FF2B5EF4-FFF2-40B4-BE49-F238E27FC236}">
+                <a16:creationId xmlns:a16="http://schemas.microsoft.com/office/drawing/2014/main" id="{48CB98E7-DD60-47E0-A859-9F7EF1862127}"/>
+              </a:ext>
+            </a:extLst>
+          </p:cNvPr>
+          <p:cNvSpPr>
+            <a:spLocks noGrp="1"/>
+          </p:cNvSpPr>
+          <p:nvPr>
+            <p:ph type="dt" sz="half" idx="10"/>
+          </p:nvPr>
+        </p:nvSpPr>
+        <p:spPr/>
+        <p:txBody>
+          <a:bodyPr/>
+          <a:lstStyle/>
+          <a:p>
+            <a:fld id="{A92CD3DC-9EE5-4241-A1F9-69B506CAE177}" type="datetime1">
+              <a:rPr lang="de-CH" smtClean="0"/>
+              <a:t>11.05.2019</a:t>
+            </a:fld>
+            <a:endParaRPr lang="en-US" dirty="0"/>
+          </a:p>
+        </p:txBody>
+      </p:sp>
+      <p:sp>
+        <p:nvSpPr>
+          <p:cNvPr id="3" name="Slide Number Placeholder 2">
+            <a:extLst>
+              <a:ext uri="{FF2B5EF4-FFF2-40B4-BE49-F238E27FC236}">
+                <a16:creationId xmlns:a16="http://schemas.microsoft.com/office/drawing/2014/main" id="{DD155966-8EA5-4F71-9F28-09FA26CAE5A0}"/>
+              </a:ext>
+            </a:extLst>
+          </p:cNvPr>
+          <p:cNvSpPr>
+            <a:spLocks noGrp="1"/>
+          </p:cNvSpPr>
+          <p:nvPr>
+            <p:ph type="sldNum" sz="quarter" idx="12"/>
+          </p:nvPr>
+        </p:nvSpPr>
+        <p:spPr/>
+        <p:txBody>
+          <a:bodyPr/>
+          <a:lstStyle/>
+          <a:p>
+            <a:fld id="{4FAB73BC-B049-4115-A692-8D63A059BFB8}" type="slidenum">
+              <a:rPr lang="en-US" smtClean="0"/>
+              <a:pPr/>
+              <a:t>53</a:t>
+            </a:fld>
+            <a:endParaRPr lang="en-US" dirty="0"/>
+          </a:p>
+        </p:txBody>
+      </p:sp>
+      <p:pic>
+        <p:nvPicPr>
+          <p:cNvPr id="8" name="Picture 7">
+            <a:extLst>
+              <a:ext uri="{FF2B5EF4-FFF2-40B4-BE49-F238E27FC236}">
+                <a16:creationId xmlns:a16="http://schemas.microsoft.com/office/drawing/2014/main" id="{38F3E66D-46E7-48B6-8770-8ACA3A4B637F}"/>
+              </a:ext>
+            </a:extLst>
+          </p:cNvPr>
+          <p:cNvPicPr>
+            <a:picLocks noChangeAspect="1"/>
+          </p:cNvPicPr>
+          <p:nvPr/>
+        </p:nvPicPr>
+        <p:blipFill>
+          <a:blip r:embed="rId3"/>
+          <a:stretch>
+            <a:fillRect/>
+          </a:stretch>
+        </p:blipFill>
+        <p:spPr>
+          <a:xfrm>
+            <a:off x="319720" y="736490"/>
+            <a:ext cx="12192000" cy="5385019"/>
+          </a:xfrm>
+          <a:prstGeom prst="rect">
+            <a:avLst/>
+          </a:prstGeom>
+        </p:spPr>
+      </p:pic>
+    </p:spTree>
+    <p:extLst>
+      <p:ext uri="{BB962C8B-B14F-4D97-AF65-F5344CB8AC3E}">
+        <p14:creationId xmlns:p14="http://schemas.microsoft.com/office/powerpoint/2010/main" val="2858191842"/>
+      </p:ext>
+    </p:extLst>
+  </p:cSld>
+  <p:clrMapOvr>
+    <a:masterClrMapping/>
+  </p:clrMapOvr>
+</p:sld>
+</file>
+
+<file path=ppt/slides/slide54.xml><?xml version="1.0" encoding="utf-8"?>
+<p:sld xmlns:a="http://schemas.openxmlformats.org/drawingml/2006/main" xmlns:r="http://schemas.openxmlformats.org/officeDocument/2006/relationships" xmlns:p="http://schemas.openxmlformats.org/presentationml/2006/main">
+  <p:cSld>
+    <p:spTree>
+      <p:nvGrpSpPr>
+        <p:cNvPr id="1" name=""/>
+        <p:cNvGrpSpPr/>
+        <p:nvPr/>
+      </p:nvGrpSpPr>
+      <p:grpSpPr>
+        <a:xfrm>
+          <a:off x="0" y="0"/>
+          <a:ext cx="0" cy="0"/>
+          <a:chOff x="0" y="0"/>
+          <a:chExt cx="0" cy="0"/>
+        </a:xfrm>
+      </p:grpSpPr>
+      <p:sp>
+        <p:nvSpPr>
           <p:cNvPr id="4" name="Title 3">
             <a:extLst>
               <a:ext uri="{FF2B5EF4-FFF2-40B4-BE49-F238E27FC236}">
@@ -47944,7 +49942,7 @@
             <a:fld id="{4FAB73BC-B049-4115-A692-8D63A059BFB8}" type="slidenum">
               <a:rPr lang="en-US" smtClean="0"/>
               <a:pPr/>
-              <a:t>47</a:t>
+              <a:t>54</a:t>
             </a:fld>
             <a:endParaRPr lang="en-US" dirty="0"/>
           </a:p>
@@ -48129,7 +50127,7 @@
 </p:sld>
 </file>
 
-<file path=ppt/slides/slide48.xml><?xml version="1.0" encoding="utf-8"?>
+<file path=ppt/slides/slide55.xml><?xml version="1.0" encoding="utf-8"?>
 <p:sld xmlns:a="http://schemas.openxmlformats.org/drawingml/2006/main" xmlns:r="http://schemas.openxmlformats.org/officeDocument/2006/relationships" xmlns:p="http://schemas.openxmlformats.org/presentationml/2006/main">
   <p:cSld>
     <p:spTree>
@@ -48238,7 +50236,7 @@
             <a:fld id="{4FAB73BC-B049-4115-A692-8D63A059BFB8}" type="slidenum">
               <a:rPr lang="en-US" smtClean="0"/>
               <a:pPr/>
-              <a:t>48</a:t>
+              <a:t>55</a:t>
             </a:fld>
             <a:endParaRPr lang="en-US" dirty="0"/>
           </a:p>
@@ -49045,7 +51043,7 @@
 </p:sld>
 </file>
 
-<file path=ppt/slides/slide49.xml><?xml version="1.0" encoding="utf-8"?>
+<file path=ppt/slides/slide56.xml><?xml version="1.0" encoding="utf-8"?>
 <p:sld xmlns:a="http://schemas.openxmlformats.org/drawingml/2006/main" xmlns:r="http://schemas.openxmlformats.org/officeDocument/2006/relationships" xmlns:p="http://schemas.openxmlformats.org/presentationml/2006/main">
   <p:cSld>
     <p:spTree>
@@ -49064,10 +51062,70 @@
       </p:grpSpPr>
       <p:sp>
         <p:nvSpPr>
+          <p:cNvPr id="3" name="Text Placeholder 2">
+            <a:extLst>
+              <a:ext uri="{FF2B5EF4-FFF2-40B4-BE49-F238E27FC236}">
+                <a16:creationId xmlns:a16="http://schemas.microsoft.com/office/drawing/2014/main" id="{F3677402-7DF5-44EE-A2AB-D90537B348C1}"/>
+              </a:ext>
+            </a:extLst>
+          </p:cNvPr>
+          <p:cNvSpPr>
+            <a:spLocks noGrp="1"/>
+          </p:cNvSpPr>
+          <p:nvPr>
+            <p:ph sz="quarter" idx="13"/>
+          </p:nvPr>
+        </p:nvSpPr>
+        <p:spPr/>
+        <p:txBody>
+          <a:bodyPr/>
+          <a:lstStyle/>
+          <a:p>
+            <a:pPr algn="l"/>
+            <a:r>
+              <a:rPr lang="en-US" dirty="0"/>
+              <a:t>Adam Zurada </a:t>
+            </a:r>
+            <a:r>
+              <a:rPr lang="en-US" dirty="0">
+                <a:hlinkClick r:id="rId3"/>
+              </a:rPr>
+              <a:t>adam.zurada1@swisscom.com</a:t>
+            </a:r>
+            <a:r>
+              <a:rPr lang="en-US" dirty="0"/>
+              <a:t> or </a:t>
+            </a:r>
+            <a:r>
+              <a:rPr lang="en-US" dirty="0">
+                <a:hlinkClick r:id="rId4"/>
+              </a:rPr>
+              <a:t>adamzurada@gmail.com</a:t>
+            </a:r>
+            <a:endParaRPr lang="en-US" dirty="0"/>
+          </a:p>
+          <a:p>
+            <a:pPr algn="l"/>
+            <a:r>
+              <a:rPr lang="en-US" dirty="0"/>
+              <a:t>GitHub: presentation &amp; example code for Kafka: </a:t>
+            </a:r>
+            <a:r>
+              <a:rPr lang="de-CH" dirty="0">
+                <a:hlinkClick r:id="rId5"/>
+              </a:rPr>
+              <a:t>https://github.com/zurada/kafka-talk</a:t>
+            </a:r>
+            <a:endParaRPr lang="de-CH" dirty="0"/>
+          </a:p>
+        </p:txBody>
+      </p:sp>
+      <p:sp>
+        <p:nvSpPr>
           <p:cNvPr id="2" name="Title 1">
             <a:extLst>
               <a:ext uri="{FF2B5EF4-FFF2-40B4-BE49-F238E27FC236}">
-                <a16:creationId xmlns:a16="http://schemas.microsoft.com/office/drawing/2014/main" id="{1AD0ED22-A066-4739-87AB-466B65AEF71E}"/>
+                <a16:creationId xmlns:a16="http://schemas.microsoft.com/office/drawing/2014/main" id="{F310019B-A982-4ACA-B10F-282AF96B8AFE}"/>
               </a:ext>
             </a:extLst>
           </p:cNvPr>
@@ -49078,19 +51136,14 @@
             <p:ph type="title"/>
           </p:nvPr>
         </p:nvSpPr>
-        <p:spPr>
-          <a:xfrm>
-            <a:off x="252918" y="1123837"/>
-            <a:ext cx="3163381" cy="4601183"/>
-          </a:xfrm>
-        </p:spPr>
+        <p:spPr/>
         <p:txBody>
           <a:bodyPr/>
           <a:lstStyle/>
           <a:p>
             <a:r>
               <a:rPr lang="en-US" dirty="0"/>
-              <a:t>Aggregations</a:t>
+              <a:t>Thanks!</a:t>
             </a:r>
             <a:endParaRPr lang="de-CH" dirty="0"/>
           </a:p>
@@ -49098,10 +51151,10 @@
       </p:sp>
       <p:sp>
         <p:nvSpPr>
-          <p:cNvPr id="3" name="Date Placeholder 2">
+          <p:cNvPr id="4" name="Date Placeholder 3">
             <a:extLst>
               <a:ext uri="{FF2B5EF4-FFF2-40B4-BE49-F238E27FC236}">
-                <a16:creationId xmlns:a16="http://schemas.microsoft.com/office/drawing/2014/main" id="{8CB2E5A9-B7D1-48BB-862F-6E52015D073A}"/>
+                <a16:creationId xmlns:a16="http://schemas.microsoft.com/office/drawing/2014/main" id="{0162BC00-1651-4B24-8444-322940513D22}"/>
               </a:ext>
             </a:extLst>
           </p:cNvPr>
@@ -49117,9 +51170,9 @@
           <a:bodyPr/>
           <a:lstStyle/>
           <a:p>
-            <a:fld id="{97B7E7BF-8BAF-4B0F-8062-A4798342EA6C}" type="datetime1">
+            <a:fld id="{3585A500-F2B2-4BC6-8A74-BF3FC162DAAC}" type="datetime1">
               <a:rPr lang="de-CH" smtClean="0"/>
-              <a:t>11.05.2019</a:t>
+              <a:t>12.05.2019</a:t>
             </a:fld>
             <a:endParaRPr lang="en-US" dirty="0"/>
           </a:p>
@@ -49127,10 +51180,10 @@
       </p:sp>
       <p:sp>
         <p:nvSpPr>
-          <p:cNvPr id="4" name="Slide Number Placeholder 3">
+          <p:cNvPr id="6" name="Slide Number Placeholder 5">
             <a:extLst>
               <a:ext uri="{FF2B5EF4-FFF2-40B4-BE49-F238E27FC236}">
-                <a16:creationId xmlns:a16="http://schemas.microsoft.com/office/drawing/2014/main" id="{EF694106-FECF-4461-BF14-73F514F976C6}"/>
+                <a16:creationId xmlns:a16="http://schemas.microsoft.com/office/drawing/2014/main" id="{E250F823-E5E8-41F3-891D-0E7D7F61A8B1}"/>
               </a:ext>
             </a:extLst>
           </p:cNvPr>
@@ -49149,1355 +51202,16 @@
             <a:fld id="{4FAB73BC-B049-4115-A692-8D63A059BFB8}" type="slidenum">
               <a:rPr lang="en-US" smtClean="0"/>
               <a:pPr/>
-              <a:t>49</a:t>
+              <a:t>56</a:t>
             </a:fld>
             <a:endParaRPr lang="en-US" dirty="0"/>
-          </a:p>
-        </p:txBody>
-      </p:sp>
-      <p:sp>
-        <p:nvSpPr>
-          <p:cNvPr id="5" name="TextBox 4">
-            <a:extLst>
-              <a:ext uri="{FF2B5EF4-FFF2-40B4-BE49-F238E27FC236}">
-                <a16:creationId xmlns:a16="http://schemas.microsoft.com/office/drawing/2014/main" id="{2CBF8B32-FFD5-44AB-82B7-CDD178911546}"/>
-              </a:ext>
-            </a:extLst>
-          </p:cNvPr>
-          <p:cNvSpPr txBox="1"/>
-          <p:nvPr/>
-        </p:nvSpPr>
-        <p:spPr>
-          <a:xfrm>
-            <a:off x="4521200" y="2832100"/>
-            <a:ext cx="5497980" cy="1200329"/>
-          </a:xfrm>
-          <a:prstGeom prst="rect">
-            <a:avLst/>
-          </a:prstGeom>
-          <a:noFill/>
-        </p:spPr>
-        <p:txBody>
-          <a:bodyPr wrap="none" rtlCol="0">
-            <a:spAutoFit/>
-          </a:bodyPr>
-          <a:lstStyle/>
-          <a:p>
-            <a:pPr marL="285750" indent="-285750">
-              <a:buFontTx/>
-              <a:buChar char="-"/>
-            </a:pPr>
-            <a:r>
-              <a:rPr lang="en-US" dirty="0"/>
-              <a:t>Challenge: MISTAKE: result as list</a:t>
-            </a:r>
-          </a:p>
-          <a:p>
-            <a:pPr marL="285750" indent="-285750">
-              <a:buFontTx/>
-              <a:buChar char="-"/>
-            </a:pPr>
-            <a:r>
-              <a:rPr lang="en-US" dirty="0"/>
-              <a:t>Challenge: MISTAKE: join with global tables – polling</a:t>
-            </a:r>
-          </a:p>
-          <a:p>
-            <a:endParaRPr lang="en-US" dirty="0"/>
-          </a:p>
-          <a:p>
-            <a:endParaRPr lang="de-CH" dirty="0"/>
           </a:p>
         </p:txBody>
       </p:sp>
     </p:spTree>
     <p:extLst>
       <p:ext uri="{BB962C8B-B14F-4D97-AF65-F5344CB8AC3E}">
-        <p14:creationId xmlns:p14="http://schemas.microsoft.com/office/powerpoint/2010/main" val="1320802605"/>
-      </p:ext>
-    </p:extLst>
-  </p:cSld>
-  <p:clrMapOvr>
-    <a:masterClrMapping/>
-  </p:clrMapOvr>
-</p:sld>
-</file>
-
-<file path=ppt/slides/slide5.xml><?xml version="1.0" encoding="utf-8"?>
-<p:sld xmlns:a="http://schemas.openxmlformats.org/drawingml/2006/main" xmlns:r="http://schemas.openxmlformats.org/officeDocument/2006/relationships" xmlns:p="http://schemas.openxmlformats.org/presentationml/2006/main">
-  <p:cSld>
-    <p:spTree>
-      <p:nvGrpSpPr>
-        <p:cNvPr id="1" name=""/>
-        <p:cNvGrpSpPr/>
-        <p:nvPr/>
-      </p:nvGrpSpPr>
-      <p:grpSpPr>
-        <a:xfrm>
-          <a:off x="0" y="0"/>
-          <a:ext cx="0" cy="0"/>
-          <a:chOff x="0" y="0"/>
-          <a:chExt cx="0" cy="0"/>
-        </a:xfrm>
-      </p:grpSpPr>
-      <p:sp>
-        <p:nvSpPr>
-          <p:cNvPr id="2" name="Date Placeholder 1">
-            <a:extLst>
-              <a:ext uri="{FF2B5EF4-FFF2-40B4-BE49-F238E27FC236}">
-                <a16:creationId xmlns:a16="http://schemas.microsoft.com/office/drawing/2014/main" id="{48CB98E7-DD60-47E0-A859-9F7EF1862127}"/>
-              </a:ext>
-            </a:extLst>
-          </p:cNvPr>
-          <p:cNvSpPr>
-            <a:spLocks noGrp="1"/>
-          </p:cNvSpPr>
-          <p:nvPr>
-            <p:ph type="dt" sz="half" idx="10"/>
-          </p:nvPr>
-        </p:nvSpPr>
-        <p:spPr/>
-        <p:txBody>
-          <a:bodyPr/>
-          <a:lstStyle/>
-          <a:p>
-            <a:fld id="{A92CD3DC-9EE5-4241-A1F9-69B506CAE177}" type="datetime1">
-              <a:rPr lang="de-CH" smtClean="0"/>
-              <a:t>11.05.2019</a:t>
-            </a:fld>
-            <a:endParaRPr lang="en-US" dirty="0"/>
-          </a:p>
-        </p:txBody>
-      </p:sp>
-      <p:sp>
-        <p:nvSpPr>
-          <p:cNvPr id="3" name="Slide Number Placeholder 2">
-            <a:extLst>
-              <a:ext uri="{FF2B5EF4-FFF2-40B4-BE49-F238E27FC236}">
-                <a16:creationId xmlns:a16="http://schemas.microsoft.com/office/drawing/2014/main" id="{DD155966-8EA5-4F71-9F28-09FA26CAE5A0}"/>
-              </a:ext>
-            </a:extLst>
-          </p:cNvPr>
-          <p:cNvSpPr>
-            <a:spLocks noGrp="1"/>
-          </p:cNvSpPr>
-          <p:nvPr>
-            <p:ph type="sldNum" sz="quarter" idx="12"/>
-          </p:nvPr>
-        </p:nvSpPr>
-        <p:spPr/>
-        <p:txBody>
-          <a:bodyPr/>
-          <a:lstStyle/>
-          <a:p>
-            <a:fld id="{4FAB73BC-B049-4115-A692-8D63A059BFB8}" type="slidenum">
-              <a:rPr lang="en-US" smtClean="0"/>
-              <a:pPr/>
-              <a:t>5</a:t>
-            </a:fld>
-            <a:endParaRPr lang="en-US" dirty="0"/>
-          </a:p>
-        </p:txBody>
-      </p:sp>
-      <p:sp>
-        <p:nvSpPr>
-          <p:cNvPr id="4" name="Content Placeholder 3">
-            <a:extLst>
-              <a:ext uri="{FF2B5EF4-FFF2-40B4-BE49-F238E27FC236}">
-                <a16:creationId xmlns:a16="http://schemas.microsoft.com/office/drawing/2014/main" id="{CD9C6660-F24D-47B4-9642-20FD7CC82BE2}"/>
-              </a:ext>
-            </a:extLst>
-          </p:cNvPr>
-          <p:cNvSpPr>
-            <a:spLocks noGrp="1"/>
-          </p:cNvSpPr>
-          <p:nvPr>
-            <p:ph sz="quarter" idx="13"/>
-          </p:nvPr>
-        </p:nvSpPr>
-        <p:spPr/>
-        <p:txBody>
-          <a:bodyPr/>
-          <a:lstStyle/>
-          <a:p>
-            <a:pPr algn="l"/>
-            <a:r>
-              <a:rPr lang="en-US" dirty="0"/>
-              <a:t>Bank application:</a:t>
-            </a:r>
-          </a:p>
-          <a:p>
-            <a:pPr lvl="1" algn="l"/>
-            <a:r>
-              <a:rPr lang="en-US" dirty="0"/>
-              <a:t>Manage Users</a:t>
-            </a:r>
-          </a:p>
-          <a:p>
-            <a:pPr lvl="1" algn="l"/>
-            <a:r>
-              <a:rPr lang="en-US" dirty="0"/>
-              <a:t>Manage Transactions</a:t>
-            </a:r>
-          </a:p>
-          <a:p>
-            <a:pPr lvl="1" algn="l"/>
-            <a:r>
-              <a:rPr lang="en-US" dirty="0"/>
-              <a:t>Have all history of system for auditing</a:t>
-            </a:r>
-          </a:p>
-          <a:p>
-            <a:pPr lvl="1" algn="l"/>
-            <a:r>
-              <a:rPr lang="en-US" dirty="0"/>
-              <a:t>Additionally: monitoring tools and statistics</a:t>
-            </a:r>
-          </a:p>
-          <a:p>
-            <a:pPr algn="l"/>
-            <a:endParaRPr lang="en-US" dirty="0"/>
-          </a:p>
-        </p:txBody>
-      </p:sp>
-      <p:sp>
-        <p:nvSpPr>
-          <p:cNvPr id="5" name="Title 4">
-            <a:extLst>
-              <a:ext uri="{FF2B5EF4-FFF2-40B4-BE49-F238E27FC236}">
-                <a16:creationId xmlns:a16="http://schemas.microsoft.com/office/drawing/2014/main" id="{AC1CD463-82EF-48C5-B62A-FBAFE04BA805}"/>
-              </a:ext>
-            </a:extLst>
-          </p:cNvPr>
-          <p:cNvSpPr>
-            <a:spLocks noGrp="1"/>
-          </p:cNvSpPr>
-          <p:nvPr>
-            <p:ph type="title"/>
-          </p:nvPr>
-        </p:nvSpPr>
-        <p:spPr/>
-        <p:txBody>
-          <a:bodyPr/>
-          <a:lstStyle/>
-          <a:p>
-            <a:r>
-              <a:rPr lang="en-US" dirty="0"/>
-              <a:t>1. Our use case</a:t>
-            </a:r>
-            <a:endParaRPr lang="de-CH" dirty="0"/>
-          </a:p>
-        </p:txBody>
-      </p:sp>
-    </p:spTree>
-    <p:extLst>
-      <p:ext uri="{BB962C8B-B14F-4D97-AF65-F5344CB8AC3E}">
-        <p14:creationId xmlns:p14="http://schemas.microsoft.com/office/powerpoint/2010/main" val="4225473306"/>
-      </p:ext>
-    </p:extLst>
-  </p:cSld>
-  <p:clrMapOvr>
-    <a:masterClrMapping/>
-  </p:clrMapOvr>
-</p:sld>
-</file>
-
-<file path=ppt/slides/slide50.xml><?xml version="1.0" encoding="utf-8"?>
-<p:sld xmlns:a="http://schemas.openxmlformats.org/drawingml/2006/main" xmlns:r="http://schemas.openxmlformats.org/officeDocument/2006/relationships" xmlns:p="http://schemas.openxmlformats.org/presentationml/2006/main">
-  <p:cSld>
-    <p:spTree>
-      <p:nvGrpSpPr>
-        <p:cNvPr id="1" name=""/>
-        <p:cNvGrpSpPr/>
-        <p:nvPr/>
-      </p:nvGrpSpPr>
-      <p:grpSpPr>
-        <a:xfrm>
-          <a:off x="0" y="0"/>
-          <a:ext cx="0" cy="0"/>
-          <a:chOff x="0" y="0"/>
-          <a:chExt cx="0" cy="0"/>
-        </a:xfrm>
-      </p:grpSpPr>
-      <p:sp>
-        <p:nvSpPr>
-          <p:cNvPr id="2" name="Title 1">
-            <a:extLst>
-              <a:ext uri="{FF2B5EF4-FFF2-40B4-BE49-F238E27FC236}">
-                <a16:creationId xmlns:a16="http://schemas.microsoft.com/office/drawing/2014/main" id="{21628B8C-6622-45A3-B5A7-B65F275EC6E9}"/>
-              </a:ext>
-            </a:extLst>
-          </p:cNvPr>
-          <p:cNvSpPr>
-            <a:spLocks noGrp="1"/>
-          </p:cNvSpPr>
-          <p:nvPr>
-            <p:ph type="title"/>
-          </p:nvPr>
-        </p:nvSpPr>
-        <p:spPr/>
-        <p:txBody>
-          <a:bodyPr/>
-          <a:lstStyle/>
-          <a:p>
-            <a:r>
-              <a:rPr lang="en-US" dirty="0"/>
-              <a:t>How to query?</a:t>
-            </a:r>
-            <a:endParaRPr lang="de-CH" dirty="0"/>
-          </a:p>
-        </p:txBody>
-      </p:sp>
-      <p:sp>
-        <p:nvSpPr>
-          <p:cNvPr id="3" name="Date Placeholder 2">
-            <a:extLst>
-              <a:ext uri="{FF2B5EF4-FFF2-40B4-BE49-F238E27FC236}">
-                <a16:creationId xmlns:a16="http://schemas.microsoft.com/office/drawing/2014/main" id="{69E110A0-72B9-4C56-8952-FD8F2DEEC0C6}"/>
-              </a:ext>
-            </a:extLst>
-          </p:cNvPr>
-          <p:cNvSpPr>
-            <a:spLocks noGrp="1"/>
-          </p:cNvSpPr>
-          <p:nvPr>
-            <p:ph type="dt" sz="half" idx="10"/>
-          </p:nvPr>
-        </p:nvSpPr>
-        <p:spPr/>
-        <p:txBody>
-          <a:bodyPr/>
-          <a:lstStyle/>
-          <a:p>
-            <a:fld id="{97B7E7BF-8BAF-4B0F-8062-A4798342EA6C}" type="datetime1">
-              <a:rPr lang="de-CH" smtClean="0"/>
-              <a:t>11.05.2019</a:t>
-            </a:fld>
-            <a:endParaRPr lang="en-US" dirty="0"/>
-          </a:p>
-        </p:txBody>
-      </p:sp>
-      <p:sp>
-        <p:nvSpPr>
-          <p:cNvPr id="4" name="Slide Number Placeholder 3">
-            <a:extLst>
-              <a:ext uri="{FF2B5EF4-FFF2-40B4-BE49-F238E27FC236}">
-                <a16:creationId xmlns:a16="http://schemas.microsoft.com/office/drawing/2014/main" id="{F78E6526-B4B7-47EB-B465-4F186852C693}"/>
-              </a:ext>
-            </a:extLst>
-          </p:cNvPr>
-          <p:cNvSpPr>
-            <a:spLocks noGrp="1"/>
-          </p:cNvSpPr>
-          <p:nvPr>
-            <p:ph type="sldNum" sz="quarter" idx="12"/>
-          </p:nvPr>
-        </p:nvSpPr>
-        <p:spPr/>
-        <p:txBody>
-          <a:bodyPr/>
-          <a:lstStyle/>
-          <a:p>
-            <a:fld id="{4FAB73BC-B049-4115-A692-8D63A059BFB8}" type="slidenum">
-              <a:rPr lang="en-US" smtClean="0"/>
-              <a:pPr/>
-              <a:t>50</a:t>
-            </a:fld>
-            <a:endParaRPr lang="en-US" dirty="0"/>
-          </a:p>
-        </p:txBody>
-      </p:sp>
-      <p:sp>
-        <p:nvSpPr>
-          <p:cNvPr id="5" name="TextBox 4">
-            <a:extLst>
-              <a:ext uri="{FF2B5EF4-FFF2-40B4-BE49-F238E27FC236}">
-                <a16:creationId xmlns:a16="http://schemas.microsoft.com/office/drawing/2014/main" id="{A8626FA6-8752-4E29-A052-932A62ED47F6}"/>
-              </a:ext>
-            </a:extLst>
-          </p:cNvPr>
-          <p:cNvSpPr txBox="1"/>
-          <p:nvPr/>
-        </p:nvSpPr>
-        <p:spPr>
-          <a:xfrm>
-            <a:off x="4478922" y="1498600"/>
-            <a:ext cx="4074320" cy="1754326"/>
-          </a:xfrm>
-          <a:prstGeom prst="rect">
-            <a:avLst/>
-          </a:prstGeom>
-          <a:noFill/>
-        </p:spPr>
-        <p:txBody>
-          <a:bodyPr wrap="none" rtlCol="0">
-            <a:spAutoFit/>
-          </a:bodyPr>
-          <a:lstStyle/>
-          <a:p>
-            <a:pPr marL="285750" indent="-285750">
-              <a:buFontTx/>
-              <a:buChar char="-"/>
-            </a:pPr>
-            <a:r>
-              <a:rPr lang="en-US" dirty="0"/>
-              <a:t>Problem of .all() for filtering</a:t>
-            </a:r>
-          </a:p>
-          <a:p>
-            <a:pPr marL="285750" indent="-285750">
-              <a:buFontTx/>
-              <a:buChar char="-"/>
-            </a:pPr>
-            <a:r>
-              <a:rPr lang="en-US" dirty="0"/>
-              <a:t>Key range idea – next slide</a:t>
-            </a:r>
-          </a:p>
-          <a:p>
-            <a:pPr marL="285750" indent="-285750">
-              <a:buFontTx/>
-              <a:buChar char="-"/>
-            </a:pPr>
-            <a:r>
-              <a:rPr lang="en-US" dirty="0"/>
-              <a:t>Kafka Connect</a:t>
-            </a:r>
-          </a:p>
-          <a:p>
-            <a:pPr marL="285750" indent="-285750">
-              <a:buFontTx/>
-              <a:buChar char="-"/>
-            </a:pPr>
-            <a:r>
-              <a:rPr lang="en-US" dirty="0"/>
-              <a:t>Direct wrap of Kafka Streams with JPA</a:t>
-            </a:r>
-          </a:p>
-          <a:p>
-            <a:endParaRPr lang="en-US" dirty="0"/>
-          </a:p>
-          <a:p>
-            <a:pPr marL="285750" indent="-285750">
-              <a:buFontTx/>
-              <a:buChar char="-"/>
-            </a:pPr>
-            <a:endParaRPr lang="de-CH" dirty="0"/>
-          </a:p>
-        </p:txBody>
-      </p:sp>
-    </p:spTree>
-    <p:extLst>
-      <p:ext uri="{BB962C8B-B14F-4D97-AF65-F5344CB8AC3E}">
-        <p14:creationId xmlns:p14="http://schemas.microsoft.com/office/powerpoint/2010/main" val="934046466"/>
-      </p:ext>
-    </p:extLst>
-  </p:cSld>
-  <p:clrMapOvr>
-    <a:masterClrMapping/>
-  </p:clrMapOvr>
-</p:sld>
-</file>
-
-<file path=ppt/slides/slide51.xml><?xml version="1.0" encoding="utf-8"?>
-<p:sld xmlns:a="http://schemas.openxmlformats.org/drawingml/2006/main" xmlns:r="http://schemas.openxmlformats.org/officeDocument/2006/relationships" xmlns:p="http://schemas.openxmlformats.org/presentationml/2006/main">
-  <p:cSld>
-    <p:spTree>
-      <p:nvGrpSpPr>
-        <p:cNvPr id="1" name=""/>
-        <p:cNvGrpSpPr/>
-        <p:nvPr/>
-      </p:nvGrpSpPr>
-      <p:grpSpPr>
-        <a:xfrm>
-          <a:off x="0" y="0"/>
-          <a:ext cx="0" cy="0"/>
-          <a:chOff x="0" y="0"/>
-          <a:chExt cx="0" cy="0"/>
-        </a:xfrm>
-      </p:grpSpPr>
-      <p:sp>
-        <p:nvSpPr>
-          <p:cNvPr id="2" name="Title 1">
-            <a:extLst>
-              <a:ext uri="{FF2B5EF4-FFF2-40B4-BE49-F238E27FC236}">
-                <a16:creationId xmlns:a16="http://schemas.microsoft.com/office/drawing/2014/main" id="{21628B8C-6622-45A3-B5A7-B65F275EC6E9}"/>
-              </a:ext>
-            </a:extLst>
-          </p:cNvPr>
-          <p:cNvSpPr>
-            <a:spLocks noGrp="1"/>
-          </p:cNvSpPr>
-          <p:nvPr>
-            <p:ph type="title"/>
-          </p:nvPr>
-        </p:nvSpPr>
-        <p:spPr/>
-        <p:txBody>
-          <a:bodyPr/>
-          <a:lstStyle/>
-          <a:p>
-            <a:r>
-              <a:rPr lang="en-US" dirty="0"/>
-              <a:t>So what is key?</a:t>
-            </a:r>
-            <a:br>
-              <a:rPr lang="en-US" dirty="0"/>
-            </a:br>
-            <a:br>
-              <a:rPr lang="en-US" dirty="0"/>
-            </a:br>
-            <a:r>
-              <a:rPr lang="en-US" dirty="0"/>
-              <a:t>Relationship solution</a:t>
-            </a:r>
-            <a:endParaRPr lang="de-CH" dirty="0"/>
-          </a:p>
-        </p:txBody>
-      </p:sp>
-      <p:sp>
-        <p:nvSpPr>
-          <p:cNvPr id="3" name="Date Placeholder 2">
-            <a:extLst>
-              <a:ext uri="{FF2B5EF4-FFF2-40B4-BE49-F238E27FC236}">
-                <a16:creationId xmlns:a16="http://schemas.microsoft.com/office/drawing/2014/main" id="{69E110A0-72B9-4C56-8952-FD8F2DEEC0C6}"/>
-              </a:ext>
-            </a:extLst>
-          </p:cNvPr>
-          <p:cNvSpPr>
-            <a:spLocks noGrp="1"/>
-          </p:cNvSpPr>
-          <p:nvPr>
-            <p:ph type="dt" sz="half" idx="10"/>
-          </p:nvPr>
-        </p:nvSpPr>
-        <p:spPr/>
-        <p:txBody>
-          <a:bodyPr/>
-          <a:lstStyle/>
-          <a:p>
-            <a:fld id="{97B7E7BF-8BAF-4B0F-8062-A4798342EA6C}" type="datetime1">
-              <a:rPr lang="de-CH" smtClean="0"/>
-              <a:t>11.05.2019</a:t>
-            </a:fld>
-            <a:endParaRPr lang="en-US" dirty="0"/>
-          </a:p>
-        </p:txBody>
-      </p:sp>
-      <p:sp>
-        <p:nvSpPr>
-          <p:cNvPr id="4" name="Slide Number Placeholder 3">
-            <a:extLst>
-              <a:ext uri="{FF2B5EF4-FFF2-40B4-BE49-F238E27FC236}">
-                <a16:creationId xmlns:a16="http://schemas.microsoft.com/office/drawing/2014/main" id="{F78E6526-B4B7-47EB-B465-4F186852C693}"/>
-              </a:ext>
-            </a:extLst>
-          </p:cNvPr>
-          <p:cNvSpPr>
-            <a:spLocks noGrp="1"/>
-          </p:cNvSpPr>
-          <p:nvPr>
-            <p:ph type="sldNum" sz="quarter" idx="12"/>
-          </p:nvPr>
-        </p:nvSpPr>
-        <p:spPr/>
-        <p:txBody>
-          <a:bodyPr/>
-          <a:lstStyle/>
-          <a:p>
-            <a:fld id="{4FAB73BC-B049-4115-A692-8D63A059BFB8}" type="slidenum">
-              <a:rPr lang="en-US" smtClean="0"/>
-              <a:pPr/>
-              <a:t>51</a:t>
-            </a:fld>
-            <a:endParaRPr lang="en-US" dirty="0"/>
-          </a:p>
-        </p:txBody>
-      </p:sp>
-      <p:sp>
-        <p:nvSpPr>
-          <p:cNvPr id="5" name="TextBox 4">
-            <a:extLst>
-              <a:ext uri="{FF2B5EF4-FFF2-40B4-BE49-F238E27FC236}">
-                <a16:creationId xmlns:a16="http://schemas.microsoft.com/office/drawing/2014/main" id="{A8626FA6-8752-4E29-A052-932A62ED47F6}"/>
-              </a:ext>
-            </a:extLst>
-          </p:cNvPr>
-          <p:cNvSpPr txBox="1"/>
-          <p:nvPr/>
-        </p:nvSpPr>
-        <p:spPr>
-          <a:xfrm>
-            <a:off x="4478922" y="1498600"/>
-            <a:ext cx="6621749" cy="3693319"/>
-          </a:xfrm>
-          <a:prstGeom prst="rect">
-            <a:avLst/>
-          </a:prstGeom>
-          <a:noFill/>
-        </p:spPr>
-        <p:txBody>
-          <a:bodyPr wrap="none" rtlCol="0">
-            <a:spAutoFit/>
-          </a:bodyPr>
-          <a:lstStyle/>
-          <a:p>
-            <a:r>
-              <a:rPr lang="en-US" dirty="0" err="1"/>
-              <a:t>organisationUUID</a:t>
-            </a:r>
-            <a:r>
-              <a:rPr lang="en-US" dirty="0"/>
-              <a:t>, then get one row </a:t>
-            </a:r>
-            <a:r>
-              <a:rPr lang="en-US" dirty="0" err="1"/>
-              <a:t>userUUID</a:t>
-            </a:r>
-            <a:r>
-              <a:rPr lang="en-US" dirty="0"/>
-              <a:t> or iterate </a:t>
-            </a:r>
-            <a:r>
-              <a:rPr lang="en-US" dirty="0">
-                <a:sym typeface="Wingdings" panose="05000000000000000000" pitchFamily="2" charset="2"/>
-              </a:rPr>
-              <a:t></a:t>
-            </a:r>
-          </a:p>
-          <a:p>
-            <a:endParaRPr lang="en-US" dirty="0">
-              <a:sym typeface="Wingdings" panose="05000000000000000000" pitchFamily="2" charset="2"/>
-            </a:endParaRPr>
-          </a:p>
-          <a:p>
-            <a:r>
-              <a:rPr lang="en-US" dirty="0">
-                <a:sym typeface="Wingdings" panose="05000000000000000000" pitchFamily="2" charset="2"/>
-              </a:rPr>
-              <a:t>Problem of lists? Problem of iteration?</a:t>
-            </a:r>
-          </a:p>
-          <a:p>
-            <a:endParaRPr lang="en-US" dirty="0">
-              <a:sym typeface="Wingdings" panose="05000000000000000000" pitchFamily="2" charset="2"/>
-            </a:endParaRPr>
-          </a:p>
-          <a:p>
-            <a:r>
-              <a:rPr lang="en-US" dirty="0">
-                <a:sym typeface="Wingdings" panose="05000000000000000000" pitchFamily="2" charset="2"/>
-              </a:rPr>
-              <a:t>vs</a:t>
-            </a:r>
-          </a:p>
-          <a:p>
-            <a:endParaRPr lang="en-US" dirty="0">
-              <a:sym typeface="Wingdings" panose="05000000000000000000" pitchFamily="2" charset="2"/>
-            </a:endParaRPr>
-          </a:p>
-          <a:p>
-            <a:r>
-              <a:rPr lang="en-US" dirty="0">
-                <a:sym typeface="Wingdings" panose="05000000000000000000" pitchFamily="2" charset="2"/>
-              </a:rPr>
-              <a:t>Compound key:</a:t>
-            </a:r>
-          </a:p>
-          <a:p>
-            <a:r>
-              <a:rPr lang="en-US" dirty="0" err="1">
-                <a:sym typeface="Wingdings" panose="05000000000000000000" pitchFamily="2" charset="2"/>
-              </a:rPr>
-              <a:t>organisationUUID:userUUid:positionUuid</a:t>
-            </a:r>
-            <a:endParaRPr lang="en-US" dirty="0">
-              <a:sym typeface="Wingdings" panose="05000000000000000000" pitchFamily="2" charset="2"/>
-            </a:endParaRPr>
-          </a:p>
-          <a:p>
-            <a:endParaRPr lang="en-US" dirty="0">
-              <a:sym typeface="Wingdings" panose="05000000000000000000" pitchFamily="2" charset="2"/>
-            </a:endParaRPr>
-          </a:p>
-          <a:p>
-            <a:endParaRPr lang="en-US" dirty="0">
-              <a:sym typeface="Wingdings" panose="05000000000000000000" pitchFamily="2" charset="2"/>
-            </a:endParaRPr>
-          </a:p>
-          <a:p>
-            <a:r>
-              <a:rPr lang="en-US" dirty="0">
-                <a:sym typeface="Wingdings" panose="05000000000000000000" pitchFamily="2" charset="2"/>
-              </a:rPr>
-              <a:t>TASK:</a:t>
-            </a:r>
-          </a:p>
-          <a:p>
-            <a:r>
-              <a:rPr lang="en-US" dirty="0">
-                <a:sym typeface="Wingdings" panose="05000000000000000000" pitchFamily="2" charset="2"/>
-              </a:rPr>
-              <a:t>Give me all users for organization! How is it with both approaches?</a:t>
-            </a:r>
-            <a:endParaRPr lang="en-US" dirty="0"/>
-          </a:p>
-          <a:p>
-            <a:pPr marL="285750" indent="-285750">
-              <a:buFontTx/>
-              <a:buChar char="-"/>
-            </a:pPr>
-            <a:endParaRPr lang="de-CH" dirty="0"/>
-          </a:p>
-        </p:txBody>
-      </p:sp>
-    </p:spTree>
-    <p:extLst>
-      <p:ext uri="{BB962C8B-B14F-4D97-AF65-F5344CB8AC3E}">
-        <p14:creationId xmlns:p14="http://schemas.microsoft.com/office/powerpoint/2010/main" val="1915667348"/>
-      </p:ext>
-    </p:extLst>
-  </p:cSld>
-  <p:clrMapOvr>
-    <a:masterClrMapping/>
-  </p:clrMapOvr>
-</p:sld>
-</file>
-
-<file path=ppt/slides/slide52.xml><?xml version="1.0" encoding="utf-8"?>
-<p:sld xmlns:a="http://schemas.openxmlformats.org/drawingml/2006/main" xmlns:r="http://schemas.openxmlformats.org/officeDocument/2006/relationships" xmlns:p="http://schemas.openxmlformats.org/presentationml/2006/main">
-  <p:cSld>
-    <p:spTree>
-      <p:nvGrpSpPr>
-        <p:cNvPr id="1" name=""/>
-        <p:cNvGrpSpPr/>
-        <p:nvPr/>
-      </p:nvGrpSpPr>
-      <p:grpSpPr>
-        <a:xfrm>
-          <a:off x="0" y="0"/>
-          <a:ext cx="0" cy="0"/>
-          <a:chOff x="0" y="0"/>
-          <a:chExt cx="0" cy="0"/>
-        </a:xfrm>
-      </p:grpSpPr>
-      <p:sp>
-        <p:nvSpPr>
-          <p:cNvPr id="2" name="Title 1">
-            <a:extLst>
-              <a:ext uri="{FF2B5EF4-FFF2-40B4-BE49-F238E27FC236}">
-                <a16:creationId xmlns:a16="http://schemas.microsoft.com/office/drawing/2014/main" id="{774EF505-A460-4D36-8E05-9EEB7085DF24}"/>
-              </a:ext>
-            </a:extLst>
-          </p:cNvPr>
-          <p:cNvSpPr>
-            <a:spLocks noGrp="1"/>
-          </p:cNvSpPr>
-          <p:nvPr>
-            <p:ph type="title"/>
-          </p:nvPr>
-        </p:nvSpPr>
-        <p:spPr/>
-        <p:txBody>
-          <a:bodyPr/>
-          <a:lstStyle/>
-          <a:p>
-            <a:r>
-              <a:rPr lang="en-US" dirty="0"/>
-              <a:t>Start stop loops</a:t>
-            </a:r>
-            <a:endParaRPr lang="de-CH" dirty="0"/>
-          </a:p>
-        </p:txBody>
-      </p:sp>
-      <p:sp>
-        <p:nvSpPr>
-          <p:cNvPr id="3" name="Date Placeholder 2">
-            <a:extLst>
-              <a:ext uri="{FF2B5EF4-FFF2-40B4-BE49-F238E27FC236}">
-                <a16:creationId xmlns:a16="http://schemas.microsoft.com/office/drawing/2014/main" id="{A81489DE-02CB-410F-A982-2D60C25D7C00}"/>
-              </a:ext>
-            </a:extLst>
-          </p:cNvPr>
-          <p:cNvSpPr>
-            <a:spLocks noGrp="1"/>
-          </p:cNvSpPr>
-          <p:nvPr>
-            <p:ph type="dt" sz="half" idx="10"/>
-          </p:nvPr>
-        </p:nvSpPr>
-        <p:spPr/>
-        <p:txBody>
-          <a:bodyPr/>
-          <a:lstStyle/>
-          <a:p>
-            <a:fld id="{97B7E7BF-8BAF-4B0F-8062-A4798342EA6C}" type="datetime1">
-              <a:rPr lang="de-CH" smtClean="0"/>
-              <a:t>11.05.2019</a:t>
-            </a:fld>
-            <a:endParaRPr lang="en-US" dirty="0"/>
-          </a:p>
-        </p:txBody>
-      </p:sp>
-      <p:sp>
-        <p:nvSpPr>
-          <p:cNvPr id="4" name="Slide Number Placeholder 3">
-            <a:extLst>
-              <a:ext uri="{FF2B5EF4-FFF2-40B4-BE49-F238E27FC236}">
-                <a16:creationId xmlns:a16="http://schemas.microsoft.com/office/drawing/2014/main" id="{D0ADC00F-DEBA-426B-8F96-ADFA1AC6D014}"/>
-              </a:ext>
-            </a:extLst>
-          </p:cNvPr>
-          <p:cNvSpPr>
-            <a:spLocks noGrp="1"/>
-          </p:cNvSpPr>
-          <p:nvPr>
-            <p:ph type="sldNum" sz="quarter" idx="12"/>
-          </p:nvPr>
-        </p:nvSpPr>
-        <p:spPr/>
-        <p:txBody>
-          <a:bodyPr/>
-          <a:lstStyle/>
-          <a:p>
-            <a:fld id="{4FAB73BC-B049-4115-A692-8D63A059BFB8}" type="slidenum">
-              <a:rPr lang="en-US" smtClean="0"/>
-              <a:pPr/>
-              <a:t>52</a:t>
-            </a:fld>
-            <a:endParaRPr lang="en-US" dirty="0"/>
-          </a:p>
-        </p:txBody>
-      </p:sp>
-      <p:sp>
-        <p:nvSpPr>
-          <p:cNvPr id="5" name="TextBox 4">
-            <a:extLst>
-              <a:ext uri="{FF2B5EF4-FFF2-40B4-BE49-F238E27FC236}">
-                <a16:creationId xmlns:a16="http://schemas.microsoft.com/office/drawing/2014/main" id="{6EC0916A-68EB-4F76-8C68-E4EB4C7B13DD}"/>
-              </a:ext>
-            </a:extLst>
-          </p:cNvPr>
-          <p:cNvSpPr txBox="1"/>
-          <p:nvPr/>
-        </p:nvSpPr>
-        <p:spPr>
-          <a:xfrm>
-            <a:off x="4419600" y="1993900"/>
-            <a:ext cx="2754472" cy="646331"/>
-          </a:xfrm>
-          <a:prstGeom prst="rect">
-            <a:avLst/>
-          </a:prstGeom>
-          <a:noFill/>
-        </p:spPr>
-        <p:txBody>
-          <a:bodyPr wrap="none" rtlCol="0">
-            <a:spAutoFit/>
-          </a:bodyPr>
-          <a:lstStyle/>
-          <a:p>
-            <a:r>
-              <a:rPr lang="en-US" dirty="0"/>
-              <a:t>- What kind of exceptions?</a:t>
-            </a:r>
-          </a:p>
-          <a:p>
-            <a:r>
-              <a:rPr lang="en-US" dirty="0"/>
-              <a:t>- Dead letter queues?  </a:t>
-            </a:r>
-            <a:endParaRPr lang="de-CH" dirty="0"/>
-          </a:p>
-        </p:txBody>
-      </p:sp>
-    </p:spTree>
-    <p:extLst>
-      <p:ext uri="{BB962C8B-B14F-4D97-AF65-F5344CB8AC3E}">
-        <p14:creationId xmlns:p14="http://schemas.microsoft.com/office/powerpoint/2010/main" val="877000401"/>
-      </p:ext>
-    </p:extLst>
-  </p:cSld>
-  <p:clrMapOvr>
-    <a:masterClrMapping/>
-  </p:clrMapOvr>
-</p:sld>
-</file>
-
-<file path=ppt/slides/slide53.xml><?xml version="1.0" encoding="utf-8"?>
-<p:sld xmlns:a="http://schemas.openxmlformats.org/drawingml/2006/main" xmlns:r="http://schemas.openxmlformats.org/officeDocument/2006/relationships" xmlns:p="http://schemas.openxmlformats.org/presentationml/2006/main">
-  <p:cSld>
-    <p:spTree>
-      <p:nvGrpSpPr>
-        <p:cNvPr id="1" name=""/>
-        <p:cNvGrpSpPr/>
-        <p:nvPr/>
-      </p:nvGrpSpPr>
-      <p:grpSpPr>
-        <a:xfrm>
-          <a:off x="0" y="0"/>
-          <a:ext cx="0" cy="0"/>
-          <a:chOff x="0" y="0"/>
-          <a:chExt cx="0" cy="0"/>
-        </a:xfrm>
-      </p:grpSpPr>
-      <p:sp>
-        <p:nvSpPr>
-          <p:cNvPr id="2" name="Title 1">
-            <a:extLst>
-              <a:ext uri="{FF2B5EF4-FFF2-40B4-BE49-F238E27FC236}">
-                <a16:creationId xmlns:a16="http://schemas.microsoft.com/office/drawing/2014/main" id="{9A2F7395-2F24-4BF9-AE6B-96288D91D783}"/>
-              </a:ext>
-            </a:extLst>
-          </p:cNvPr>
-          <p:cNvSpPr>
-            <a:spLocks noGrp="1"/>
-          </p:cNvSpPr>
-          <p:nvPr>
-            <p:ph type="title"/>
-          </p:nvPr>
-        </p:nvSpPr>
-        <p:spPr/>
-        <p:txBody>
-          <a:bodyPr/>
-          <a:lstStyle/>
-          <a:p>
-            <a:r>
-              <a:rPr lang="en-US" dirty="0"/>
-              <a:t>How to do transactions?</a:t>
-            </a:r>
-            <a:endParaRPr lang="de-CH" dirty="0"/>
-          </a:p>
-        </p:txBody>
-      </p:sp>
-      <p:sp>
-        <p:nvSpPr>
-          <p:cNvPr id="3" name="Date Placeholder 2">
-            <a:extLst>
-              <a:ext uri="{FF2B5EF4-FFF2-40B4-BE49-F238E27FC236}">
-                <a16:creationId xmlns:a16="http://schemas.microsoft.com/office/drawing/2014/main" id="{1203E256-73A9-432C-9C80-B8C75A6A1BC6}"/>
-              </a:ext>
-            </a:extLst>
-          </p:cNvPr>
-          <p:cNvSpPr>
-            <a:spLocks noGrp="1"/>
-          </p:cNvSpPr>
-          <p:nvPr>
-            <p:ph type="dt" sz="half" idx="10"/>
-          </p:nvPr>
-        </p:nvSpPr>
-        <p:spPr/>
-        <p:txBody>
-          <a:bodyPr/>
-          <a:lstStyle/>
-          <a:p>
-            <a:fld id="{97B7E7BF-8BAF-4B0F-8062-A4798342EA6C}" type="datetime1">
-              <a:rPr lang="de-CH" smtClean="0"/>
-              <a:t>11.05.2019</a:t>
-            </a:fld>
-            <a:endParaRPr lang="en-US" dirty="0"/>
-          </a:p>
-        </p:txBody>
-      </p:sp>
-      <p:sp>
-        <p:nvSpPr>
-          <p:cNvPr id="4" name="Slide Number Placeholder 3">
-            <a:extLst>
-              <a:ext uri="{FF2B5EF4-FFF2-40B4-BE49-F238E27FC236}">
-                <a16:creationId xmlns:a16="http://schemas.microsoft.com/office/drawing/2014/main" id="{25941B95-5414-4D41-BA19-5BDE855BBDF8}"/>
-              </a:ext>
-            </a:extLst>
-          </p:cNvPr>
-          <p:cNvSpPr>
-            <a:spLocks noGrp="1"/>
-          </p:cNvSpPr>
-          <p:nvPr>
-            <p:ph type="sldNum" sz="quarter" idx="12"/>
-          </p:nvPr>
-        </p:nvSpPr>
-        <p:spPr/>
-        <p:txBody>
-          <a:bodyPr/>
-          <a:lstStyle/>
-          <a:p>
-            <a:fld id="{4FAB73BC-B049-4115-A692-8D63A059BFB8}" type="slidenum">
-              <a:rPr lang="en-US" smtClean="0"/>
-              <a:pPr/>
-              <a:t>53</a:t>
-            </a:fld>
-            <a:endParaRPr lang="en-US" dirty="0"/>
-          </a:p>
-        </p:txBody>
-      </p:sp>
-      <p:sp>
-        <p:nvSpPr>
-          <p:cNvPr id="5" name="TextBox 4">
-            <a:extLst>
-              <a:ext uri="{FF2B5EF4-FFF2-40B4-BE49-F238E27FC236}">
-                <a16:creationId xmlns:a16="http://schemas.microsoft.com/office/drawing/2014/main" id="{4258E892-4660-49CB-9388-AEBDAEFDD0EB}"/>
-              </a:ext>
-            </a:extLst>
-          </p:cNvPr>
-          <p:cNvSpPr txBox="1"/>
-          <p:nvPr/>
-        </p:nvSpPr>
-        <p:spPr>
-          <a:xfrm>
-            <a:off x="4622800" y="1562100"/>
-            <a:ext cx="3414909" cy="923330"/>
-          </a:xfrm>
-          <a:prstGeom prst="rect">
-            <a:avLst/>
-          </a:prstGeom>
-          <a:noFill/>
-        </p:spPr>
-        <p:txBody>
-          <a:bodyPr wrap="none" rtlCol="0">
-            <a:spAutoFit/>
-          </a:bodyPr>
-          <a:lstStyle/>
-          <a:p>
-            <a:pPr marL="285750" indent="-285750">
-              <a:buFontTx/>
-              <a:buChar char="-"/>
-            </a:pPr>
-            <a:r>
-              <a:rPr lang="en-US" dirty="0"/>
-              <a:t>Transactions for Kafka: rollback</a:t>
-            </a:r>
-          </a:p>
-          <a:p>
-            <a:pPr marL="285750" indent="-285750">
-              <a:buFontTx/>
-              <a:buChar char="-"/>
-            </a:pPr>
-            <a:r>
-              <a:rPr lang="en-US" dirty="0"/>
-              <a:t>Direct producers</a:t>
-            </a:r>
-          </a:p>
-          <a:p>
-            <a:pPr marL="285750" indent="-285750">
-              <a:buFontTx/>
-              <a:buChar char="-"/>
-            </a:pPr>
-            <a:r>
-              <a:rPr lang="en-US" dirty="0"/>
-              <a:t>External calls as last step</a:t>
-            </a:r>
-            <a:endParaRPr lang="de-CH" dirty="0"/>
-          </a:p>
-        </p:txBody>
-      </p:sp>
-    </p:spTree>
-    <p:extLst>
-      <p:ext uri="{BB962C8B-B14F-4D97-AF65-F5344CB8AC3E}">
-        <p14:creationId xmlns:p14="http://schemas.microsoft.com/office/powerpoint/2010/main" val="3995027513"/>
-      </p:ext>
-    </p:extLst>
-  </p:cSld>
-  <p:clrMapOvr>
-    <a:masterClrMapping/>
-  </p:clrMapOvr>
-</p:sld>
-</file>
-
-<file path=ppt/slides/slide54.xml><?xml version="1.0" encoding="utf-8"?>
-<p:sld xmlns:a="http://schemas.openxmlformats.org/drawingml/2006/main" xmlns:r="http://schemas.openxmlformats.org/officeDocument/2006/relationships" xmlns:p="http://schemas.openxmlformats.org/presentationml/2006/main">
-  <p:cSld>
-    <p:spTree>
-      <p:nvGrpSpPr>
-        <p:cNvPr id="1" name=""/>
-        <p:cNvGrpSpPr/>
-        <p:nvPr/>
-      </p:nvGrpSpPr>
-      <p:grpSpPr>
-        <a:xfrm>
-          <a:off x="0" y="0"/>
-          <a:ext cx="0" cy="0"/>
-          <a:chOff x="0" y="0"/>
-          <a:chExt cx="0" cy="0"/>
-        </a:xfrm>
-      </p:grpSpPr>
-      <p:sp>
-        <p:nvSpPr>
-          <p:cNvPr id="2" name="Date Placeholder 1">
-            <a:extLst>
-              <a:ext uri="{FF2B5EF4-FFF2-40B4-BE49-F238E27FC236}">
-                <a16:creationId xmlns:a16="http://schemas.microsoft.com/office/drawing/2014/main" id="{48CB98E7-DD60-47E0-A859-9F7EF1862127}"/>
-              </a:ext>
-            </a:extLst>
-          </p:cNvPr>
-          <p:cNvSpPr>
-            <a:spLocks noGrp="1"/>
-          </p:cNvSpPr>
-          <p:nvPr>
-            <p:ph type="dt" sz="half" idx="10"/>
-          </p:nvPr>
-        </p:nvSpPr>
-        <p:spPr/>
-        <p:txBody>
-          <a:bodyPr/>
-          <a:lstStyle/>
-          <a:p>
-            <a:fld id="{A92CD3DC-9EE5-4241-A1F9-69B506CAE177}" type="datetime1">
-              <a:rPr lang="de-CH" smtClean="0"/>
-              <a:t>11.05.2019</a:t>
-            </a:fld>
-            <a:endParaRPr lang="en-US" dirty="0"/>
-          </a:p>
-        </p:txBody>
-      </p:sp>
-      <p:sp>
-        <p:nvSpPr>
-          <p:cNvPr id="3" name="Slide Number Placeholder 2">
-            <a:extLst>
-              <a:ext uri="{FF2B5EF4-FFF2-40B4-BE49-F238E27FC236}">
-                <a16:creationId xmlns:a16="http://schemas.microsoft.com/office/drawing/2014/main" id="{DD155966-8EA5-4F71-9F28-09FA26CAE5A0}"/>
-              </a:ext>
-            </a:extLst>
-          </p:cNvPr>
-          <p:cNvSpPr>
-            <a:spLocks noGrp="1"/>
-          </p:cNvSpPr>
-          <p:nvPr>
-            <p:ph type="sldNum" sz="quarter" idx="12"/>
-          </p:nvPr>
-        </p:nvSpPr>
-        <p:spPr/>
-        <p:txBody>
-          <a:bodyPr/>
-          <a:lstStyle/>
-          <a:p>
-            <a:fld id="{4FAB73BC-B049-4115-A692-8D63A059BFB8}" type="slidenum">
-              <a:rPr lang="en-US" smtClean="0"/>
-              <a:pPr/>
-              <a:t>54</a:t>
-            </a:fld>
-            <a:endParaRPr lang="en-US" dirty="0"/>
-          </a:p>
-        </p:txBody>
-      </p:sp>
-      <p:pic>
-        <p:nvPicPr>
-          <p:cNvPr id="6" name="Content Placeholder 5">
-            <a:extLst>
-              <a:ext uri="{FF2B5EF4-FFF2-40B4-BE49-F238E27FC236}">
-                <a16:creationId xmlns:a16="http://schemas.microsoft.com/office/drawing/2014/main" id="{D91AE75D-47E8-4E90-97D7-2F325E25B28E}"/>
-              </a:ext>
-            </a:extLst>
-          </p:cNvPr>
-          <p:cNvPicPr>
-            <a:picLocks noGrp="1" noChangeAspect="1"/>
-          </p:cNvPicPr>
-          <p:nvPr>
-            <p:ph sz="quarter" idx="13"/>
-          </p:nvPr>
-        </p:nvPicPr>
-        <p:blipFill>
-          <a:blip r:embed="rId3"/>
-          <a:stretch>
-            <a:fillRect/>
-          </a:stretch>
-        </p:blipFill>
-        <p:spPr>
-          <a:xfrm>
-            <a:off x="117586" y="1332963"/>
-            <a:ext cx="11992260" cy="4018209"/>
-          </a:xfrm>
-          <a:prstGeom prst="rect">
-            <a:avLst/>
-          </a:prstGeom>
-        </p:spPr>
-      </p:pic>
-      <p:sp>
-        <p:nvSpPr>
-          <p:cNvPr id="5" name="Title 4">
-            <a:extLst>
-              <a:ext uri="{FF2B5EF4-FFF2-40B4-BE49-F238E27FC236}">
-                <a16:creationId xmlns:a16="http://schemas.microsoft.com/office/drawing/2014/main" id="{AC1CD463-82EF-48C5-B62A-FBAFE04BA805}"/>
-              </a:ext>
-            </a:extLst>
-          </p:cNvPr>
-          <p:cNvSpPr>
-            <a:spLocks noGrp="1"/>
-          </p:cNvSpPr>
-          <p:nvPr>
-            <p:ph type="title"/>
-          </p:nvPr>
-        </p:nvSpPr>
-        <p:spPr/>
-        <p:txBody>
-          <a:bodyPr/>
-          <a:lstStyle/>
-          <a:p>
-            <a:r>
-              <a:rPr lang="en-US" dirty="0"/>
-              <a:t>6. Deployment</a:t>
-            </a:r>
-            <a:endParaRPr lang="de-CH" dirty="0"/>
-          </a:p>
-        </p:txBody>
-      </p:sp>
-      <p:sp>
-        <p:nvSpPr>
-          <p:cNvPr id="4" name="TextBox 3">
-            <a:extLst>
-              <a:ext uri="{FF2B5EF4-FFF2-40B4-BE49-F238E27FC236}">
-                <a16:creationId xmlns:a16="http://schemas.microsoft.com/office/drawing/2014/main" id="{FE136543-3920-4F5A-92C2-95682807738A}"/>
-              </a:ext>
-            </a:extLst>
-          </p:cNvPr>
-          <p:cNvSpPr txBox="1"/>
-          <p:nvPr/>
-        </p:nvSpPr>
-        <p:spPr>
-          <a:xfrm>
-            <a:off x="491802" y="5833641"/>
-            <a:ext cx="2151743" cy="369332"/>
-          </a:xfrm>
-          <a:prstGeom prst="rect">
-            <a:avLst/>
-          </a:prstGeom>
-          <a:noFill/>
-        </p:spPr>
-        <p:txBody>
-          <a:bodyPr wrap="none" rtlCol="0">
-            <a:spAutoFit/>
-          </a:bodyPr>
-          <a:lstStyle/>
-          <a:p>
-            <a:r>
-              <a:rPr lang="en-US" dirty="0"/>
-              <a:t>+ topic autocreation</a:t>
-            </a:r>
-            <a:endParaRPr lang="de-CH" dirty="0"/>
-          </a:p>
-        </p:txBody>
-      </p:sp>
-    </p:spTree>
-    <p:extLst>
-      <p:ext uri="{BB962C8B-B14F-4D97-AF65-F5344CB8AC3E}">
-        <p14:creationId xmlns:p14="http://schemas.microsoft.com/office/powerpoint/2010/main" val="2866946202"/>
-      </p:ext>
-    </p:extLst>
-  </p:cSld>
-  <p:clrMapOvr>
-    <a:masterClrMapping/>
-  </p:clrMapOvr>
-</p:sld>
-</file>
-
-<file path=ppt/slides/slide55.xml><?xml version="1.0" encoding="utf-8"?>
-<p:sld xmlns:a="http://schemas.openxmlformats.org/drawingml/2006/main" xmlns:r="http://schemas.openxmlformats.org/officeDocument/2006/relationships" xmlns:p="http://schemas.openxmlformats.org/presentationml/2006/main">
-  <p:cSld>
-    <p:spTree>
-      <p:nvGrpSpPr>
-        <p:cNvPr id="1" name=""/>
-        <p:cNvGrpSpPr/>
-        <p:nvPr/>
-      </p:nvGrpSpPr>
-      <p:grpSpPr>
-        <a:xfrm>
-          <a:off x="0" y="0"/>
-          <a:ext cx="0" cy="0"/>
-          <a:chOff x="0" y="0"/>
-          <a:chExt cx="0" cy="0"/>
-        </a:xfrm>
-      </p:grpSpPr>
-      <p:sp>
-        <p:nvSpPr>
-          <p:cNvPr id="2" name="Date Placeholder 1">
-            <a:extLst>
-              <a:ext uri="{FF2B5EF4-FFF2-40B4-BE49-F238E27FC236}">
-                <a16:creationId xmlns:a16="http://schemas.microsoft.com/office/drawing/2014/main" id="{48CB98E7-DD60-47E0-A859-9F7EF1862127}"/>
-              </a:ext>
-            </a:extLst>
-          </p:cNvPr>
-          <p:cNvSpPr>
-            <a:spLocks noGrp="1"/>
-          </p:cNvSpPr>
-          <p:nvPr>
-            <p:ph type="dt" sz="half" idx="10"/>
-          </p:nvPr>
-        </p:nvSpPr>
-        <p:spPr/>
-        <p:txBody>
-          <a:bodyPr/>
-          <a:lstStyle/>
-          <a:p>
-            <a:fld id="{A92CD3DC-9EE5-4241-A1F9-69B506CAE177}" type="datetime1">
-              <a:rPr lang="de-CH" smtClean="0"/>
-              <a:t>11.05.2019</a:t>
-            </a:fld>
-            <a:endParaRPr lang="en-US" dirty="0"/>
-          </a:p>
-        </p:txBody>
-      </p:sp>
-      <p:sp>
-        <p:nvSpPr>
-          <p:cNvPr id="3" name="Slide Number Placeholder 2">
-            <a:extLst>
-              <a:ext uri="{FF2B5EF4-FFF2-40B4-BE49-F238E27FC236}">
-                <a16:creationId xmlns:a16="http://schemas.microsoft.com/office/drawing/2014/main" id="{DD155966-8EA5-4F71-9F28-09FA26CAE5A0}"/>
-              </a:ext>
-            </a:extLst>
-          </p:cNvPr>
-          <p:cNvSpPr>
-            <a:spLocks noGrp="1"/>
-          </p:cNvSpPr>
-          <p:nvPr>
-            <p:ph type="sldNum" sz="quarter" idx="12"/>
-          </p:nvPr>
-        </p:nvSpPr>
-        <p:spPr/>
-        <p:txBody>
-          <a:bodyPr/>
-          <a:lstStyle/>
-          <a:p>
-            <a:fld id="{4FAB73BC-B049-4115-A692-8D63A059BFB8}" type="slidenum">
-              <a:rPr lang="en-US" smtClean="0"/>
-              <a:pPr/>
-              <a:t>55</a:t>
-            </a:fld>
-            <a:endParaRPr lang="en-US" dirty="0"/>
-          </a:p>
-        </p:txBody>
-      </p:sp>
-      <p:pic>
-        <p:nvPicPr>
-          <p:cNvPr id="8" name="Picture 7">
-            <a:extLst>
-              <a:ext uri="{FF2B5EF4-FFF2-40B4-BE49-F238E27FC236}">
-                <a16:creationId xmlns:a16="http://schemas.microsoft.com/office/drawing/2014/main" id="{38F3E66D-46E7-48B6-8770-8ACA3A4B637F}"/>
-              </a:ext>
-            </a:extLst>
-          </p:cNvPr>
-          <p:cNvPicPr>
-            <a:picLocks noChangeAspect="1"/>
-          </p:cNvPicPr>
-          <p:nvPr/>
-        </p:nvPicPr>
-        <p:blipFill>
-          <a:blip r:embed="rId3"/>
-          <a:stretch>
-            <a:fillRect/>
-          </a:stretch>
-        </p:blipFill>
-        <p:spPr>
-          <a:xfrm>
-            <a:off x="319720" y="736490"/>
-            <a:ext cx="12192000" cy="5385019"/>
-          </a:xfrm>
-          <a:prstGeom prst="rect">
-            <a:avLst/>
-          </a:prstGeom>
-        </p:spPr>
-      </p:pic>
-    </p:spTree>
-    <p:extLst>
-      <p:ext uri="{BB962C8B-B14F-4D97-AF65-F5344CB8AC3E}">
-        <p14:creationId xmlns:p14="http://schemas.microsoft.com/office/powerpoint/2010/main" val="2858191842"/>
+        <p14:creationId xmlns:p14="http://schemas.microsoft.com/office/powerpoint/2010/main" val="2589020171"/>
       </p:ext>
     </p:extLst>
   </p:cSld>

</xml_diff>